<commit_message>
Update Introduction to Class Programming Part 1.pptx
</commit_message>
<xml_diff>
--- a/Introduction to Class Programming Part 1.pptx
+++ b/Introduction to Class Programming Part 1.pptx
@@ -7,7 +7,7 @@
     <p:sldMasterId id="2147483673" r:id="rId3"/>
   </p:sldMasterIdLst>
   <p:notesMasterIdLst>
-    <p:notesMasterId r:id="rId40"/>
+    <p:notesMasterId r:id="rId41"/>
   </p:notesMasterIdLst>
   <p:sldIdLst>
     <p:sldId id="256" r:id="rId4"/>
@@ -23,29 +23,30 @@
     <p:sldId id="286" r:id="rId14"/>
     <p:sldId id="314" r:id="rId15"/>
     <p:sldId id="278" r:id="rId16"/>
-    <p:sldId id="298" r:id="rId17"/>
-    <p:sldId id="277" r:id="rId18"/>
-    <p:sldId id="276" r:id="rId19"/>
-    <p:sldId id="319" r:id="rId20"/>
-    <p:sldId id="279" r:id="rId21"/>
-    <p:sldId id="299" r:id="rId22"/>
-    <p:sldId id="268" r:id="rId23"/>
-    <p:sldId id="315" r:id="rId24"/>
-    <p:sldId id="285" r:id="rId25"/>
-    <p:sldId id="303" r:id="rId26"/>
-    <p:sldId id="320" r:id="rId27"/>
-    <p:sldId id="322" r:id="rId28"/>
-    <p:sldId id="300" r:id="rId29"/>
-    <p:sldId id="321" r:id="rId30"/>
-    <p:sldId id="270" r:id="rId31"/>
-    <p:sldId id="267" r:id="rId32"/>
-    <p:sldId id="261" r:id="rId33"/>
-    <p:sldId id="295" r:id="rId34"/>
-    <p:sldId id="326" r:id="rId35"/>
-    <p:sldId id="313" r:id="rId36"/>
-    <p:sldId id="289" r:id="rId37"/>
-    <p:sldId id="290" r:id="rId38"/>
-    <p:sldId id="260" r:id="rId39"/>
+    <p:sldId id="330" r:id="rId17"/>
+    <p:sldId id="298" r:id="rId18"/>
+    <p:sldId id="277" r:id="rId19"/>
+    <p:sldId id="276" r:id="rId20"/>
+    <p:sldId id="319" r:id="rId21"/>
+    <p:sldId id="279" r:id="rId22"/>
+    <p:sldId id="299" r:id="rId23"/>
+    <p:sldId id="268" r:id="rId24"/>
+    <p:sldId id="315" r:id="rId25"/>
+    <p:sldId id="285" r:id="rId26"/>
+    <p:sldId id="303" r:id="rId27"/>
+    <p:sldId id="320" r:id="rId28"/>
+    <p:sldId id="322" r:id="rId29"/>
+    <p:sldId id="300" r:id="rId30"/>
+    <p:sldId id="321" r:id="rId31"/>
+    <p:sldId id="270" r:id="rId32"/>
+    <p:sldId id="267" r:id="rId33"/>
+    <p:sldId id="261" r:id="rId34"/>
+    <p:sldId id="295" r:id="rId35"/>
+    <p:sldId id="326" r:id="rId36"/>
+    <p:sldId id="313" r:id="rId37"/>
+    <p:sldId id="289" r:id="rId38"/>
+    <p:sldId id="290" r:id="rId39"/>
+    <p:sldId id="260" r:id="rId40"/>
   </p:sldIdLst>
   <p:sldSz cx="9144000" cy="5143500" type="screen16x9"/>
   <p:notesSz cx="6858000" cy="9144000"/>
@@ -245,7 +246,7 @@
           <a:p>
             <a:fld id="{C8D18E60-4300-4729-A0D7-6AB984C3922D}" type="datetimeFigureOut">
               <a:rPr lang="en-US" smtClean="0"/>
-              <a:t>12/14/2021</a:t>
+              <a:t>12/28/2021</a:t>
             </a:fld>
             <a:endParaRPr lang="en-US"/>
           </a:p>
@@ -763,19 +764,7 @@
           <a:p>
             <a:r>
               <a:rPr lang="en-US" dirty="0"/>
-              <a:t>You may recall Chris using color coding to show at a high level how blocks of code were moved around.</a:t>
-            </a:r>
-          </a:p>
-          <a:p>
-            <a:r>
-              <a:rPr lang="en-US" dirty="0"/>
-              <a:t>When I say plain view … I mean you had to be very aware of variable names to make sure they did not conflict.</a:t>
-            </a:r>
-          </a:p>
-          <a:p>
-            <a:r>
-              <a:rPr lang="en-US" dirty="0"/>
-              <a:t>Also the inner workings of the structure was in plain sight so the code was not a lot shorter or a lot easier to comprehend (until you got familiar with it.)</a:t>
+              <a:t>Next page shows Chris using color coding to show at a high level how blocks of code were moved around.</a:t>
             </a:r>
           </a:p>
         </p:txBody>
@@ -862,7 +851,19 @@
           <a:p>
             <a:r>
               <a:rPr lang="en-US" dirty="0"/>
-              <a:t>Enough with the ground work … move on</a:t>
+              <a:t>You may recall Chris using color coding to show at a high level how blocks of code were moved around.</a:t>
+            </a:r>
+          </a:p>
+          <a:p>
+            <a:r>
+              <a:rPr lang="en-US" dirty="0"/>
+              <a:t>When I say plain view … I mean you had to be very aware of variable names to make sure they did not conflict.</a:t>
+            </a:r>
+          </a:p>
+          <a:p>
+            <a:r>
+              <a:rPr lang="en-US" dirty="0"/>
+              <a:t>Also the inner workings of the structure was in plain sight so the code was not a lot shorter or a lot easier to comprehend (until you got familiar with it.)</a:t>
             </a:r>
           </a:p>
         </p:txBody>
@@ -893,7 +894,7 @@
     </p:spTree>
     <p:extLst>
       <p:ext uri="{BB962C8B-B14F-4D97-AF65-F5344CB8AC3E}">
-        <p14:creationId xmlns:p14="http://schemas.microsoft.com/office/powerpoint/2010/main" val="1184330936"/>
+        <p14:creationId xmlns:p14="http://schemas.microsoft.com/office/powerpoint/2010/main" val="2117579037"/>
       </p:ext>
     </p:extLst>
   </p:cSld>
@@ -949,31 +950,8 @@
           <a:p>
             <a:r>
               <a:rPr lang="en-US" dirty="0"/>
-              <a:t>Using a class means you interact with it according to the authors wishes only.</a:t>
-            </a:r>
-          </a:p>
-          <a:p>
-            <a:r>
-              <a:rPr lang="en-US" sz="1200" dirty="0"/>
-              <a:t>Being able to look into a class and with what we are about to cover you can download and Inspect other peoples ‘classes’  and use them with confidence.</a:t>
-            </a:r>
-          </a:p>
-          <a:p>
-            <a:r>
-              <a:rPr lang="en-US" sz="1200" dirty="0"/>
-              <a:t>You can write your own classes.</a:t>
-            </a:r>
-            <a:endParaRPr lang="en-US" sz="1200" dirty="0">
-              <a:solidFill>
-                <a:schemeClr val="tx2">
-                  <a:lumMod val="60000"/>
-                  <a:lumOff val="40000"/>
-                </a:schemeClr>
-              </a:solidFill>
-            </a:endParaRPr>
-          </a:p>
-          <a:p>
-            <a:endParaRPr lang="en-US" dirty="0"/>
+              <a:t>Enough with the ground work … move on</a:t>
+            </a:r>
           </a:p>
         </p:txBody>
       </p:sp>
@@ -1003,7 +981,7 @@
     </p:spTree>
     <p:extLst>
       <p:ext uri="{BB962C8B-B14F-4D97-AF65-F5344CB8AC3E}">
-        <p14:creationId xmlns:p14="http://schemas.microsoft.com/office/powerpoint/2010/main" val="1644958124"/>
+        <p14:creationId xmlns:p14="http://schemas.microsoft.com/office/powerpoint/2010/main" val="1184330936"/>
       </p:ext>
     </p:extLst>
   </p:cSld>
@@ -1059,46 +1037,31 @@
           <a:p>
             <a:r>
               <a:rPr lang="en-US" dirty="0"/>
-              <a:t>Here we are showing how the code changes as we use structures .. .and then classes.</a:t>
-            </a:r>
-          </a:p>
-          <a:p>
-            <a:r>
-              <a:rPr lang="en-US" dirty="0"/>
-              <a:t>Start with high level view (I like using pictures!). </a:t>
-            </a:r>
-          </a:p>
-          <a:p>
-            <a:r>
-              <a:rPr lang="en-US" dirty="0"/>
-              <a:t>Starting with original code – messy, (the colour bars represent different functions in the program). It is one big ‘space’ where as the programmer you had to be very concerned about keeping track of variable names and what part of the program they applied to. The logic for all the parts was generally mixed together. </a:t>
-            </a:r>
-          </a:p>
-          <a:p>
-            <a:r>
-              <a:rPr lang="en-US" dirty="0"/>
-              <a:t>After reorganizing the code is streamlined.  Slightly easier to comprehend. Overall though the program complexity is still in plain view.</a:t>
-            </a:r>
-          </a:p>
-          <a:p>
-            <a:r>
-              <a:rPr lang="en-US" dirty="0"/>
-              <a:t>With a class definition all of the ‘complexity’ is hidden from view inside the class. To use the class we may not even be aware of its internal functions. </a:t>
-            </a:r>
-          </a:p>
-          <a:p>
-            <a:r>
-              <a:rPr lang="en-US" dirty="0"/>
-              <a:t>The code for the class can be (</a:t>
-            </a:r>
-            <a:r>
-              <a:rPr lang="en-US" b="1" dirty="0"/>
-              <a:t>and commonly is</a:t>
-            </a:r>
-            <a:r>
-              <a:rPr lang="en-US" dirty="0"/>
-              <a:t>) kept in separate source files. Once the class software is developed it is saved away and is easily reused in multiple programs. Because the class code is in separate files sharing and reusing these as ‘building blocks’ is much easier.</a:t>
-            </a:r>
+              <a:t>Using a class means you interact with it according to the authors wishes only.</a:t>
+            </a:r>
+          </a:p>
+          <a:p>
+            <a:r>
+              <a:rPr lang="en-US" sz="1200" dirty="0"/>
+              <a:t>Being able to look into a class and with what we are about to cover you can download and Inspect other peoples ‘classes’  and use them with confidence.</a:t>
+            </a:r>
+          </a:p>
+          <a:p>
+            <a:r>
+              <a:rPr lang="en-US" sz="1200" dirty="0"/>
+              <a:t>You can write your own classes.</a:t>
+            </a:r>
+            <a:endParaRPr lang="en-US" sz="1200" dirty="0">
+              <a:solidFill>
+                <a:schemeClr val="tx2">
+                  <a:lumMod val="60000"/>
+                  <a:lumOff val="40000"/>
+                </a:schemeClr>
+              </a:solidFill>
+            </a:endParaRPr>
+          </a:p>
+          <a:p>
+            <a:endParaRPr lang="en-US" dirty="0"/>
           </a:p>
         </p:txBody>
       </p:sp>
@@ -1128,7 +1091,7 @@
     </p:spTree>
     <p:extLst>
       <p:ext uri="{BB962C8B-B14F-4D97-AF65-F5344CB8AC3E}">
-        <p14:creationId xmlns:p14="http://schemas.microsoft.com/office/powerpoint/2010/main" val="853992733"/>
+        <p14:creationId xmlns:p14="http://schemas.microsoft.com/office/powerpoint/2010/main" val="1644958124"/>
       </p:ext>
     </p:extLst>
   </p:cSld>
@@ -1184,196 +1147,46 @@
           <a:p>
             <a:r>
               <a:rPr lang="en-US" dirty="0"/>
-              <a:t>The blue box is my ‘shoebox’. </a:t>
-            </a:r>
-            <a:r>
-              <a:rPr lang="en-US" sz="1200" dirty="0">
-                <a:solidFill>
-                  <a:schemeClr val="tx1"/>
-                </a:solidFill>
-              </a:rPr>
-              <a:t>Complexity may be hidden inside the shoebox  (But as a user we don’t care)</a:t>
-            </a:r>
-            <a:endParaRPr lang="en-US" dirty="0"/>
+              <a:t>Here we are showing how the code changes as we use structures .. .and then classes.</a:t>
+            </a:r>
           </a:p>
           <a:p>
             <a:r>
               <a:rPr lang="en-US" dirty="0"/>
-              <a:t>Sticking out of the shoebox are three items .. Two inputs and one output    (this is not hardware  recall).  </a:t>
+              <a:t>Start with high level view (I like using pictures!). </a:t>
             </a:r>
           </a:p>
           <a:p>
             <a:r>
               <a:rPr lang="en-US" dirty="0"/>
-              <a:t>Terminology. on and off are called member functions. As we will see later inside the class definition there are software functions that implements these. And so the functions are ‘members of the class’.</a:t>
-            </a:r>
-          </a:p>
-          <a:p>
-            <a:endParaRPr lang="en-US" dirty="0"/>
-          </a:p>
-          <a:p>
+              <a:t>Starting with original code – messy, (the colour bars represent different functions in the program). It is one big ‘space’ where as the programmer you had to be very concerned about keeping track of variable names and what part of the program they applied to. The logic for all the parts was generally mixed together. </a:t>
+            </a:r>
+          </a:p>
+          <a:p>
+            <a:r>
+              <a:rPr lang="en-US" dirty="0"/>
+              <a:t>After reorganizing the code is streamlined.  Slightly easier to comprehend. Overall though the program complexity is still in plain view.</a:t>
+            </a:r>
+          </a:p>
+          <a:p>
+            <a:r>
+              <a:rPr lang="en-US" dirty="0"/>
+              <a:t>With a class definition all of the ‘complexity’ is hidden from view inside the class. To use the class we may not even be aware of its internal functions. </a:t>
+            </a:r>
+          </a:p>
+          <a:p>
+            <a:r>
+              <a:rPr lang="en-US" dirty="0"/>
+              <a:t>The code for the class can be (</a:t>
+            </a:r>
             <a:r>
               <a:rPr lang="en-US" b="1" dirty="0"/>
-              <a:t>Code box – one line  .. Grows to three with clicks.</a:t>
-            </a:r>
-          </a:p>
-          <a:p>
+              <a:t>and commonly is</a:t>
+            </a:r>
             <a:r>
               <a:rPr lang="en-US" dirty="0"/>
-              <a:t>Sven has pointed out to me that writing </a:t>
-            </a:r>
-            <a:r>
-              <a:rPr lang="en-US" sz="1200" dirty="0">
-                <a:solidFill>
-                  <a:schemeClr val="bg1"/>
-                </a:solidFill>
-              </a:rPr>
-              <a:t>the definition as "Led2 myLed1 = Led2(13);“ makes it easier to see the relationship with definition of a normal variable like "int pin = 13;" which you are familiar with.  Here is where it is useful to think of Led2 as a type.</a:t>
-            </a:r>
-          </a:p>
-          <a:p>
-            <a:endParaRPr lang="en-US" dirty="0"/>
-          </a:p>
-          <a:p>
-            <a:r>
-              <a:rPr lang="en-US" dirty="0"/>
-              <a:t>Do not be confused by the objects … they could be called anything we like … myLed1 .. myLed2 … myLed3 are just my arbitrary names.</a:t>
-            </a:r>
-          </a:p>
-          <a:p>
-            <a:pPr marL="0" marR="0" lvl="0" indent="0" algn="l" defTabSz="914400" rtl="0" eaLnBrk="1" fontAlgn="auto" latinLnBrk="0" hangingPunct="1">
-              <a:lnSpc>
-                <a:spcPct val="100000"/>
-              </a:lnSpc>
-              <a:spcBef>
-                <a:spcPts val="0"/>
-              </a:spcBef>
-              <a:spcAft>
-                <a:spcPts val="0"/>
-              </a:spcAft>
-              <a:buClrTx/>
-              <a:buSzTx/>
-              <a:buFontTx/>
-              <a:buNone/>
-              <a:tabLst/>
-              <a:defRPr/>
-            </a:pPr>
-            <a:endParaRPr lang="en-US" dirty="0"/>
-          </a:p>
-          <a:p>
-            <a:pPr marL="0" marR="0" lvl="0" indent="0" algn="l" defTabSz="914400" rtl="0" eaLnBrk="1" fontAlgn="auto" latinLnBrk="0" hangingPunct="1">
-              <a:lnSpc>
-                <a:spcPct val="100000"/>
-              </a:lnSpc>
-              <a:spcBef>
-                <a:spcPts val="0"/>
-              </a:spcBef>
-              <a:spcAft>
-                <a:spcPts val="0"/>
-              </a:spcAft>
-              <a:buClrTx/>
-              <a:buSzTx/>
-              <a:buFontTx/>
-              <a:buNone/>
-              <a:tabLst/>
-              <a:defRPr/>
-            </a:pPr>
-            <a:r>
-              <a:rPr lang="en-US" dirty="0"/>
-              <a:t>Side notes …</a:t>
-            </a:r>
-          </a:p>
-          <a:p>
-            <a:pPr marL="0" marR="0" lvl="0" indent="0" algn="l" defTabSz="914400" rtl="0" eaLnBrk="1" fontAlgn="auto" latinLnBrk="0" hangingPunct="1">
-              <a:lnSpc>
-                <a:spcPct val="100000"/>
-              </a:lnSpc>
-              <a:spcBef>
-                <a:spcPts val="0"/>
-              </a:spcBef>
-              <a:spcAft>
-                <a:spcPts val="0"/>
-              </a:spcAft>
-              <a:buClrTx/>
-              <a:buSzTx/>
-              <a:buFontTx/>
-              <a:buNone/>
-              <a:tabLst/>
-              <a:defRPr/>
-            </a:pPr>
-            <a:r>
-              <a:rPr lang="en-US" dirty="0"/>
-              <a:t>On and Off do not make a compelling case but were working up to that.</a:t>
-            </a:r>
-          </a:p>
-          <a:p>
-            <a:pPr marL="0" marR="0" lvl="0" indent="0" algn="l" defTabSz="914400" rtl="0" eaLnBrk="1" fontAlgn="auto" latinLnBrk="0" hangingPunct="1">
-              <a:lnSpc>
-                <a:spcPct val="100000"/>
-              </a:lnSpc>
-              <a:spcBef>
-                <a:spcPts val="0"/>
-              </a:spcBef>
-              <a:spcAft>
-                <a:spcPts val="0"/>
-              </a:spcAft>
-              <a:buClrTx/>
-              <a:buSzTx/>
-              <a:buFontTx/>
-              <a:buNone/>
-              <a:tabLst/>
-              <a:defRPr/>
-            </a:pPr>
-            <a:r>
-              <a:rPr lang="en-US" dirty="0"/>
-              <a:t>The class is called Led2 because it was my second go at it and for a time I had two Led classes kicking around. </a:t>
-            </a:r>
-          </a:p>
-          <a:p>
-            <a:pPr marL="0" marR="0" lvl="0" indent="0" algn="l" defTabSz="914400" rtl="0" eaLnBrk="1" fontAlgn="auto" latinLnBrk="0" hangingPunct="1">
-              <a:lnSpc>
-                <a:spcPct val="100000"/>
-              </a:lnSpc>
-              <a:spcBef>
-                <a:spcPts val="0"/>
-              </a:spcBef>
-              <a:spcAft>
-                <a:spcPts val="0"/>
-              </a:spcAft>
-              <a:buClrTx/>
-              <a:buSzTx/>
-              <a:buFontTx/>
-              <a:buNone/>
-              <a:tabLst/>
-              <a:defRPr/>
-            </a:pPr>
-            <a:r>
-              <a:rPr lang="en-US" dirty="0"/>
-              <a:t>The colour coding (blue, green, red) I have added to the slides for emphasis and learning … do not expect to see these in your Arduino IDE !</a:t>
-            </a:r>
-          </a:p>
-          <a:p>
-            <a:pPr marL="0" marR="0" lvl="0" indent="0" algn="l" defTabSz="914400" rtl="0" eaLnBrk="1" fontAlgn="auto" latinLnBrk="0" hangingPunct="1">
-              <a:lnSpc>
-                <a:spcPct val="100000"/>
-              </a:lnSpc>
-              <a:spcBef>
-                <a:spcPts val="0"/>
-              </a:spcBef>
-              <a:spcAft>
-                <a:spcPts val="0"/>
-              </a:spcAft>
-              <a:buClrTx/>
-              <a:buSzTx/>
-              <a:buFontTx/>
-              <a:buNone/>
-              <a:tabLst/>
-              <a:defRPr/>
-            </a:pPr>
-            <a:endParaRPr lang="en-US" dirty="0"/>
-          </a:p>
-          <a:p>
-            <a:endParaRPr lang="en-US" dirty="0"/>
+              <a:t>) kept in separate source files. Once the class software is developed it is saved away and is easily reused in multiple programs. Because the class code is in separate files sharing and reusing these as ‘building blocks’ is much easier.</a:t>
+            </a:r>
           </a:p>
         </p:txBody>
       </p:sp>
@@ -1403,7 +1216,7 @@
     </p:spTree>
     <p:extLst>
       <p:ext uri="{BB962C8B-B14F-4D97-AF65-F5344CB8AC3E}">
-        <p14:creationId xmlns:p14="http://schemas.microsoft.com/office/powerpoint/2010/main" val="2369604102"/>
+        <p14:creationId xmlns:p14="http://schemas.microsoft.com/office/powerpoint/2010/main" val="853992733"/>
       </p:ext>
     </p:extLst>
   </p:cSld>
@@ -1459,8 +1272,196 @@
           <a:p>
             <a:r>
               <a:rPr lang="en-US" dirty="0"/>
-              <a:t>The Picture hardly changes.</a:t>
-            </a:r>
+              <a:t>The blue box is my ‘shoebox’. </a:t>
+            </a:r>
+            <a:r>
+              <a:rPr lang="en-US" sz="1200" dirty="0">
+                <a:solidFill>
+                  <a:schemeClr val="tx1"/>
+                </a:solidFill>
+              </a:rPr>
+              <a:t>Complexity may be hidden inside the shoebox  (But as a user we don’t care)</a:t>
+            </a:r>
+            <a:endParaRPr lang="en-US" dirty="0"/>
+          </a:p>
+          <a:p>
+            <a:r>
+              <a:rPr lang="en-US" dirty="0"/>
+              <a:t>Sticking out of the shoebox are three items .. Two inputs and one output    (this is not hardware  recall).  </a:t>
+            </a:r>
+          </a:p>
+          <a:p>
+            <a:r>
+              <a:rPr lang="en-US" dirty="0"/>
+              <a:t>Terminology. on and off are called member functions. As we will see later inside the class definition there are software functions that implements these. And so the functions are ‘members of the class’.</a:t>
+            </a:r>
+          </a:p>
+          <a:p>
+            <a:endParaRPr lang="en-US" dirty="0"/>
+          </a:p>
+          <a:p>
+            <a:r>
+              <a:rPr lang="en-US" b="1" dirty="0"/>
+              <a:t>Code box – one line  .. Grows to three with clicks.</a:t>
+            </a:r>
+          </a:p>
+          <a:p>
+            <a:r>
+              <a:rPr lang="en-US" dirty="0"/>
+              <a:t>Sven has pointed out to me that writing </a:t>
+            </a:r>
+            <a:r>
+              <a:rPr lang="en-US" sz="1200" dirty="0">
+                <a:solidFill>
+                  <a:schemeClr val="bg1"/>
+                </a:solidFill>
+              </a:rPr>
+              <a:t>the definition as "Led2 myLed1 = Led2(13);“ makes it easier to see the relationship with definition of a normal variable like "int pin = 13;" which you are familiar with.  Here is where it is useful to think of Led2 as a type.</a:t>
+            </a:r>
+          </a:p>
+          <a:p>
+            <a:endParaRPr lang="en-US" dirty="0"/>
+          </a:p>
+          <a:p>
+            <a:r>
+              <a:rPr lang="en-US" dirty="0"/>
+              <a:t>Do not be confused by the objects … they could be called anything we like … myLed1 .. myLed2 … myLed3 are just my arbitrary names.</a:t>
+            </a:r>
+          </a:p>
+          <a:p>
+            <a:pPr marL="0" marR="0" lvl="0" indent="0" algn="l" defTabSz="914400" rtl="0" eaLnBrk="1" fontAlgn="auto" latinLnBrk="0" hangingPunct="1">
+              <a:lnSpc>
+                <a:spcPct val="100000"/>
+              </a:lnSpc>
+              <a:spcBef>
+                <a:spcPts val="0"/>
+              </a:spcBef>
+              <a:spcAft>
+                <a:spcPts val="0"/>
+              </a:spcAft>
+              <a:buClrTx/>
+              <a:buSzTx/>
+              <a:buFontTx/>
+              <a:buNone/>
+              <a:tabLst/>
+              <a:defRPr/>
+            </a:pPr>
+            <a:endParaRPr lang="en-US" dirty="0"/>
+          </a:p>
+          <a:p>
+            <a:pPr marL="0" marR="0" lvl="0" indent="0" algn="l" defTabSz="914400" rtl="0" eaLnBrk="1" fontAlgn="auto" latinLnBrk="0" hangingPunct="1">
+              <a:lnSpc>
+                <a:spcPct val="100000"/>
+              </a:lnSpc>
+              <a:spcBef>
+                <a:spcPts val="0"/>
+              </a:spcBef>
+              <a:spcAft>
+                <a:spcPts val="0"/>
+              </a:spcAft>
+              <a:buClrTx/>
+              <a:buSzTx/>
+              <a:buFontTx/>
+              <a:buNone/>
+              <a:tabLst/>
+              <a:defRPr/>
+            </a:pPr>
+            <a:r>
+              <a:rPr lang="en-US" dirty="0"/>
+              <a:t>Side notes …</a:t>
+            </a:r>
+          </a:p>
+          <a:p>
+            <a:pPr marL="0" marR="0" lvl="0" indent="0" algn="l" defTabSz="914400" rtl="0" eaLnBrk="1" fontAlgn="auto" latinLnBrk="0" hangingPunct="1">
+              <a:lnSpc>
+                <a:spcPct val="100000"/>
+              </a:lnSpc>
+              <a:spcBef>
+                <a:spcPts val="0"/>
+              </a:spcBef>
+              <a:spcAft>
+                <a:spcPts val="0"/>
+              </a:spcAft>
+              <a:buClrTx/>
+              <a:buSzTx/>
+              <a:buFontTx/>
+              <a:buNone/>
+              <a:tabLst/>
+              <a:defRPr/>
+            </a:pPr>
+            <a:r>
+              <a:rPr lang="en-US" dirty="0"/>
+              <a:t>On and Off do not make a compelling case but were working up to that.</a:t>
+            </a:r>
+          </a:p>
+          <a:p>
+            <a:pPr marL="0" marR="0" lvl="0" indent="0" algn="l" defTabSz="914400" rtl="0" eaLnBrk="1" fontAlgn="auto" latinLnBrk="0" hangingPunct="1">
+              <a:lnSpc>
+                <a:spcPct val="100000"/>
+              </a:lnSpc>
+              <a:spcBef>
+                <a:spcPts val="0"/>
+              </a:spcBef>
+              <a:spcAft>
+                <a:spcPts val="0"/>
+              </a:spcAft>
+              <a:buClrTx/>
+              <a:buSzTx/>
+              <a:buFontTx/>
+              <a:buNone/>
+              <a:tabLst/>
+              <a:defRPr/>
+            </a:pPr>
+            <a:r>
+              <a:rPr lang="en-US" dirty="0"/>
+              <a:t>The class is called Led2 because it was my second go at it and for a time I had two Led classes kicking around. </a:t>
+            </a:r>
+          </a:p>
+          <a:p>
+            <a:pPr marL="0" marR="0" lvl="0" indent="0" algn="l" defTabSz="914400" rtl="0" eaLnBrk="1" fontAlgn="auto" latinLnBrk="0" hangingPunct="1">
+              <a:lnSpc>
+                <a:spcPct val="100000"/>
+              </a:lnSpc>
+              <a:spcBef>
+                <a:spcPts val="0"/>
+              </a:spcBef>
+              <a:spcAft>
+                <a:spcPts val="0"/>
+              </a:spcAft>
+              <a:buClrTx/>
+              <a:buSzTx/>
+              <a:buFontTx/>
+              <a:buNone/>
+              <a:tabLst/>
+              <a:defRPr/>
+            </a:pPr>
+            <a:r>
+              <a:rPr lang="en-US" dirty="0"/>
+              <a:t>The colour coding (blue, green, red) I have added to the slides for emphasis and learning … do not expect to see these in your Arduino IDE !</a:t>
+            </a:r>
+          </a:p>
+          <a:p>
+            <a:pPr marL="0" marR="0" lvl="0" indent="0" algn="l" defTabSz="914400" rtl="0" eaLnBrk="1" fontAlgn="auto" latinLnBrk="0" hangingPunct="1">
+              <a:lnSpc>
+                <a:spcPct val="100000"/>
+              </a:lnSpc>
+              <a:spcBef>
+                <a:spcPts val="0"/>
+              </a:spcBef>
+              <a:spcAft>
+                <a:spcPts val="0"/>
+              </a:spcAft>
+              <a:buClrTx/>
+              <a:buSzTx/>
+              <a:buFontTx/>
+              <a:buNone/>
+              <a:tabLst/>
+              <a:defRPr/>
+            </a:pPr>
+            <a:endParaRPr lang="en-US" dirty="0"/>
+          </a:p>
+          <a:p>
+            <a:endParaRPr lang="en-US" dirty="0"/>
           </a:p>
         </p:txBody>
       </p:sp>
@@ -1490,7 +1491,7 @@
     </p:spTree>
     <p:extLst>
       <p:ext uri="{BB962C8B-B14F-4D97-AF65-F5344CB8AC3E}">
-        <p14:creationId xmlns:p14="http://schemas.microsoft.com/office/powerpoint/2010/main" val="1338517449"/>
+        <p14:creationId xmlns:p14="http://schemas.microsoft.com/office/powerpoint/2010/main" val="2369604102"/>
       </p:ext>
     </p:extLst>
   </p:cSld>
@@ -1546,13 +1547,7 @@
           <a:p>
             <a:r>
               <a:rPr lang="en-US" dirty="0"/>
-              <a:t>On the next few slides we will take a peek at some of the code fragments that will give you some insight as to how the class software is written.</a:t>
-            </a:r>
-          </a:p>
-          <a:p>
-            <a:r>
-              <a:rPr lang="en-US" dirty="0"/>
-              <a:t>I do need to emphasize though … these are just code fragments not complete solutions. We will get to the complete solution in part 2 of this talk. </a:t>
+              <a:t>The Picture hardly changes.</a:t>
             </a:r>
           </a:p>
         </p:txBody>
@@ -1583,7 +1578,7 @@
     </p:spTree>
     <p:extLst>
       <p:ext uri="{BB962C8B-B14F-4D97-AF65-F5344CB8AC3E}">
-        <p14:creationId xmlns:p14="http://schemas.microsoft.com/office/powerpoint/2010/main" val="1175731731"/>
+        <p14:creationId xmlns:p14="http://schemas.microsoft.com/office/powerpoint/2010/main" val="1338517449"/>
       </p:ext>
     </p:extLst>
   </p:cSld>
@@ -1639,31 +1634,13 @@
           <a:p>
             <a:r>
               <a:rPr lang="en-US" dirty="0"/>
-              <a:t>This code line is calling a special function in the class called the constructor.</a:t>
+              <a:t>On the next few slides we will take a peek at some of the code fragments that will give you some insight as to how the class software is written.</a:t>
             </a:r>
           </a:p>
           <a:p>
             <a:r>
               <a:rPr lang="en-US" dirty="0"/>
-              <a:t>Why is it called that ?  .. Not surprisingly because it will construct the object for us</a:t>
-            </a:r>
-          </a:p>
-          <a:p>
-            <a:r>
-              <a:rPr lang="en-US" dirty="0"/>
-              <a:t>What does that mean really? – talk it through  … use an Americanism – the Cookie Cutter … (or Pastry Cutter)</a:t>
-            </a:r>
-          </a:p>
-          <a:p>
-            <a:r>
-              <a:rPr lang="en-US" dirty="0"/>
-              <a:t>Writing the class software is defining the pastry cutter shape. Using the class software is using that pastry cutter to stamp out all of those mince pies you just ate!</a:t>
-            </a:r>
-          </a:p>
-          <a:p>
-            <a:r>
-              <a:rPr lang="en-US" dirty="0"/>
-              <a:t>For a given object you would only call the constructor once, after which the object can be said to exist. </a:t>
+              <a:t>I do need to emphasize though … these are just code fragments not complete solutions. We will get to the complete solution in part 2 of this talk. </a:t>
             </a:r>
           </a:p>
         </p:txBody>
@@ -1694,7 +1671,7 @@
     </p:spTree>
     <p:extLst>
       <p:ext uri="{BB962C8B-B14F-4D97-AF65-F5344CB8AC3E}">
-        <p14:creationId xmlns:p14="http://schemas.microsoft.com/office/powerpoint/2010/main" val="3464935265"/>
+        <p14:creationId xmlns:p14="http://schemas.microsoft.com/office/powerpoint/2010/main" val="1175731731"/>
       </p:ext>
     </p:extLst>
   </p:cSld>
@@ -1750,49 +1727,31 @@
           <a:p>
             <a:r>
               <a:rPr lang="en-US" dirty="0"/>
-              <a:t>This code is part of the actual class definition (I have snipped out parts while I Introduce the terminology)</a:t>
+              <a:t>This code line is calling a special function in the class called the constructor.</a:t>
             </a:r>
           </a:p>
           <a:p>
             <a:r>
               <a:rPr lang="en-US" dirty="0"/>
-              <a:t>Class / class name … curly braces just like in a structure.</a:t>
+              <a:t>Why is it called that ?  .. Not surprisingly because it will construct the object for us</a:t>
             </a:r>
           </a:p>
           <a:p>
             <a:r>
               <a:rPr lang="en-US" dirty="0"/>
-              <a:t>Some variables are declared private .. What does that mean?   They are Inside the class and not available outside the shoebox.</a:t>
+              <a:t>What does that mean really? – talk it through  … use an Americanism – the Cookie Cutter … (or Pastry Cutter)</a:t>
             </a:r>
           </a:p>
           <a:p>
             <a:r>
               <a:rPr lang="en-US" dirty="0"/>
-              <a:t>Very important concept here … every time we create a new object it will get its own set of these internal variables</a:t>
+              <a:t>Writing the class software is defining the pastry cutter shape. Using the class software is using that pastry cutter to stamp out all of those mince pies you just ate!</a:t>
             </a:r>
           </a:p>
           <a:p>
             <a:r>
               <a:rPr lang="en-US" dirty="0"/>
-              <a:t>The names wont conflict and they survive as long as the object sticks around.</a:t>
-            </a:r>
-          </a:p>
-          <a:p>
-            <a:r>
-              <a:rPr lang="en-US" dirty="0"/>
-              <a:t>My naming convention .. Private variables start with an underscore .. Helps me keep it clear.</a:t>
-            </a:r>
-          </a:p>
-          <a:p>
-            <a:r>
-              <a:rPr lang="en-US" dirty="0"/>
-              <a:t>Public variables – are what is visible to us outside the shoebox.  </a:t>
-            </a:r>
-          </a:p>
-          <a:p>
-            <a:r>
-              <a:rPr lang="en-US" dirty="0"/>
-              <a:t>You should recognize the constructor, and the other member functions off() and on()</a:t>
+              <a:t>For a given object you would only call the constructor once, after which the object can be said to exist. </a:t>
             </a:r>
           </a:p>
         </p:txBody>
@@ -1823,7 +1782,7 @@
     </p:spTree>
     <p:extLst>
       <p:ext uri="{BB962C8B-B14F-4D97-AF65-F5344CB8AC3E}">
-        <p14:creationId xmlns:p14="http://schemas.microsoft.com/office/powerpoint/2010/main" val="1372632815"/>
+        <p14:creationId xmlns:p14="http://schemas.microsoft.com/office/powerpoint/2010/main" val="3464935265"/>
       </p:ext>
     </p:extLst>
   </p:cSld>
@@ -1966,99 +1925,49 @@
           <a:p>
             <a:r>
               <a:rPr lang="en-US" dirty="0"/>
-              <a:t>Key point – every time we call the constructor a ‘new’ object is created and all of the internal class variables for one object are kept separate from any other object of same class. </a:t>
-            </a:r>
-          </a:p>
-          <a:p>
-            <a:pPr marL="0" marR="0" lvl="0" indent="0" algn="l" defTabSz="914400" rtl="0" eaLnBrk="1" fontAlgn="auto" latinLnBrk="0" hangingPunct="1">
-              <a:lnSpc>
-                <a:spcPct val="100000"/>
-              </a:lnSpc>
-              <a:spcBef>
-                <a:spcPts val="0"/>
-              </a:spcBef>
-              <a:spcAft>
-                <a:spcPts val="0"/>
-              </a:spcAft>
-              <a:buClrTx/>
-              <a:buSzTx/>
-              <a:buFontTx/>
-              <a:buNone/>
-              <a:tabLst/>
-              <a:defRPr/>
-            </a:pPr>
-            <a:r>
-              <a:rPr lang="en-US" sz="1200" dirty="0">
-                <a:solidFill>
-                  <a:schemeClr val="bg1"/>
-                </a:solidFill>
-              </a:rPr>
-              <a:t>The double colon is called the ‘scope resolution’ operator. Here it is letting the compiler know that the function Led2(byte pin) is </a:t>
-            </a:r>
-            <a:r>
-              <a:rPr lang="en-US" sz="1200" b="1" dirty="0">
-                <a:solidFill>
-                  <a:schemeClr val="bg1"/>
-                </a:solidFill>
-              </a:rPr>
-              <a:t>within the scope of </a:t>
-            </a:r>
-            <a:r>
-              <a:rPr lang="en-US" sz="1200" dirty="0">
-                <a:solidFill>
-                  <a:schemeClr val="bg1"/>
-                </a:solidFill>
-              </a:rPr>
-              <a:t>the class Led2. </a:t>
-            </a:r>
-          </a:p>
-          <a:p>
-            <a:pPr marL="0" marR="0" lvl="0" indent="0" algn="l" defTabSz="914400" rtl="0" eaLnBrk="1" fontAlgn="auto" latinLnBrk="0" hangingPunct="1">
-              <a:lnSpc>
-                <a:spcPct val="100000"/>
-              </a:lnSpc>
-              <a:spcBef>
-                <a:spcPts val="0"/>
-              </a:spcBef>
-              <a:spcAft>
-                <a:spcPts val="0"/>
-              </a:spcAft>
-              <a:buClrTx/>
-              <a:buSzTx/>
-              <a:buFontTx/>
-              <a:buNone/>
-              <a:tabLst/>
-              <a:defRPr/>
-            </a:pPr>
-            <a:r>
-              <a:rPr lang="en-US" sz="1200" dirty="0">
-                <a:solidFill>
-                  <a:schemeClr val="bg1"/>
-                </a:solidFill>
-              </a:rPr>
-              <a:t>Notice the constructor has the same name as the class .. And it does not return a type.  </a:t>
-            </a:r>
-            <a:endParaRPr lang="en-US" dirty="0"/>
-          </a:p>
-          <a:p>
-            <a:endParaRPr lang="en-US" dirty="0"/>
+              <a:t>This code is part of the actual class definition (I have snipped out parts while I Introduce the terminology)</a:t>
+            </a:r>
           </a:p>
           <a:p>
             <a:r>
               <a:rPr lang="en-US" dirty="0"/>
-              <a:t>Recall the meaning of the leading underscore which in this case is trivial. (Sometimes we might do validity checking before saving it.)</a:t>
+              <a:t>Class / class name … curly braces just like in a structure.</a:t>
             </a:r>
           </a:p>
           <a:p>
             <a:r>
               <a:rPr lang="en-US" dirty="0"/>
-              <a:t>I hope people are underwhelmed with this … When we call the constructor it will set aside memory locations for the private variables and if we tell it to it will assign values to them.</a:t>
+              <a:t>Some variables are declared private .. What does that mean?   They are Inside the class and not available outside the shoebox.</a:t>
             </a:r>
           </a:p>
           <a:p>
             <a:r>
               <a:rPr lang="en-US" dirty="0"/>
-              <a:t>In this case we are setting _pin and then using the standard Arduino function called pinMode. Note we have not actually sett the output to a value (yet).</a:t>
+              <a:t>Very important concept here … every time we create a new object it will get its own set of these internal variables</a:t>
+            </a:r>
+          </a:p>
+          <a:p>
+            <a:r>
+              <a:rPr lang="en-US" dirty="0"/>
+              <a:t>The names wont conflict and they survive as long as the object sticks around.</a:t>
+            </a:r>
+          </a:p>
+          <a:p>
+            <a:r>
+              <a:rPr lang="en-US" dirty="0"/>
+              <a:t>My naming convention .. Private variables start with an underscore .. Helps me keep it clear.</a:t>
+            </a:r>
+          </a:p>
+          <a:p>
+            <a:r>
+              <a:rPr lang="en-US" dirty="0"/>
+              <a:t>Public variables – are what is visible to us outside the shoebox.  </a:t>
+            </a:r>
+          </a:p>
+          <a:p>
+            <a:r>
+              <a:rPr lang="en-US" dirty="0"/>
+              <a:t>You should recognize the constructor, and the other member functions off() and on()</a:t>
             </a:r>
           </a:p>
         </p:txBody>
@@ -2089,7 +1998,7 @@
     </p:spTree>
     <p:extLst>
       <p:ext uri="{BB962C8B-B14F-4D97-AF65-F5344CB8AC3E}">
-        <p14:creationId xmlns:p14="http://schemas.microsoft.com/office/powerpoint/2010/main" val="3803255201"/>
+        <p14:creationId xmlns:p14="http://schemas.microsoft.com/office/powerpoint/2010/main" val="1372632815"/>
       </p:ext>
     </p:extLst>
   </p:cSld>
@@ -2145,7 +2054,7 @@
           <a:p>
             <a:r>
               <a:rPr lang="en-US" dirty="0"/>
-              <a:t>Again I hope people are underwhelmed with this … the on property is just setting private internal values.</a:t>
+              <a:t>Key point – every time we call the constructor a ‘new’ object is created and all of the internal class variables for one object are kept separate from any other object of same class. </a:t>
             </a:r>
           </a:p>
           <a:p>
@@ -2169,50 +2078,26 @@
             <a:r>
               <a:rPr lang="en-US" sz="1200" dirty="0">
                 <a:solidFill>
-                  <a:schemeClr val="tx1"/>
+                  <a:schemeClr val="bg1"/>
                 </a:solidFill>
               </a:rPr>
-              <a:t>Inside the shoebox </a:t>
+              <a:t>The double colon is called the ‘scope resolution’ operator. Here it is letting the compiler know that the function Led2(byte pin) is </a:t>
             </a:r>
             <a:r>
               <a:rPr lang="en-US" sz="1200" b="1" dirty="0">
                 <a:solidFill>
-                  <a:srgbClr val="C00000"/>
+                  <a:schemeClr val="bg1"/>
                 </a:solidFill>
               </a:rPr>
-              <a:t>on()</a:t>
+              <a:t>within the scope of </a:t>
             </a:r>
             <a:r>
               <a:rPr lang="en-US" sz="1200" dirty="0">
                 <a:solidFill>
-                  <a:schemeClr val="tx1"/>
+                  <a:schemeClr val="bg1"/>
                 </a:solidFill>
               </a:rPr>
-              <a:t> is a function that sets the private internal variable </a:t>
-            </a:r>
-            <a:r>
-              <a:rPr lang="en-US" sz="1200" dirty="0">
-                <a:solidFill>
-                  <a:srgbClr val="C00000"/>
-                </a:solidFill>
-              </a:rPr>
-              <a:t>_state </a:t>
-            </a:r>
-            <a:r>
-              <a:rPr lang="en-US" sz="1200" dirty="0">
-                <a:solidFill>
-                  <a:schemeClr val="tx1"/>
-                </a:solidFill>
-              </a:rPr>
-              <a:t>and </a:t>
-            </a:r>
-            <a:r>
-              <a:rPr lang="en-US" sz="1200" dirty="0">
-                <a:solidFill>
-                  <a:srgbClr val="C00000"/>
-                </a:solidFill>
-              </a:rPr>
-              <a:t>_blink</a:t>
+              <a:t>the class Led2. </a:t>
             </a:r>
           </a:p>
           <a:p>
@@ -2233,95 +2118,36 @@
               <a:tabLst/>
               <a:defRPr/>
             </a:pPr>
-            <a:endParaRPr lang="en-US" sz="1200" dirty="0">
-              <a:solidFill>
-                <a:srgbClr val="C00000"/>
-              </a:solidFill>
-            </a:endParaRPr>
-          </a:p>
-          <a:p>
-            <a:pPr marL="0" marR="0" lvl="0" indent="0" algn="l" defTabSz="914400" rtl="0" eaLnBrk="1" fontAlgn="auto" latinLnBrk="0" hangingPunct="1">
-              <a:lnSpc>
-                <a:spcPct val="100000"/>
-              </a:lnSpc>
-              <a:spcBef>
-                <a:spcPts val="0"/>
-              </a:spcBef>
-              <a:spcAft>
-                <a:spcPts val="0"/>
-              </a:spcAft>
-              <a:buClrTx/>
-              <a:buSzTx/>
-              <a:buFontTx/>
-              <a:buNone/>
-              <a:tabLst/>
-              <a:defRPr/>
-            </a:pPr>
             <a:r>
               <a:rPr lang="en-US" sz="1200" dirty="0">
                 <a:solidFill>
-                  <a:srgbClr val="C00000"/>
+                  <a:schemeClr val="bg1"/>
                 </a:solidFill>
               </a:rPr>
-              <a:t>I could have just made the state a public variable (not private) and then we could write to it directly.</a:t>
-            </a:r>
-          </a:p>
-          <a:p>
-            <a:pPr marL="0" marR="0" lvl="0" indent="0" algn="l" defTabSz="914400" rtl="0" eaLnBrk="1" fontAlgn="auto" latinLnBrk="0" hangingPunct="1">
-              <a:lnSpc>
-                <a:spcPct val="100000"/>
-              </a:lnSpc>
-              <a:spcBef>
-                <a:spcPts val="0"/>
-              </a:spcBef>
-              <a:spcAft>
-                <a:spcPts val="0"/>
-              </a:spcAft>
-              <a:buClrTx/>
-              <a:buSzTx/>
-              <a:buFontTx/>
-              <a:buNone/>
-              <a:tabLst/>
-              <a:defRPr/>
-            </a:pPr>
-            <a:r>
-              <a:rPr lang="en-US" sz="1200" dirty="0">
-                <a:solidFill>
-                  <a:srgbClr val="C00000"/>
-                </a:solidFill>
-              </a:rPr>
-              <a:t>Generally doing this is a poor idea as doing so does not allow the possibility of error checking and users could enter values you are not expecting.</a:t>
-            </a:r>
-          </a:p>
-          <a:p>
-            <a:pPr marL="0" marR="0" lvl="0" indent="0" algn="l" defTabSz="914400" rtl="0" eaLnBrk="1" fontAlgn="auto" latinLnBrk="0" hangingPunct="1">
-              <a:lnSpc>
-                <a:spcPct val="100000"/>
-              </a:lnSpc>
-              <a:spcBef>
-                <a:spcPts val="0"/>
-              </a:spcBef>
-              <a:spcAft>
-                <a:spcPts val="0"/>
-              </a:spcAft>
-              <a:buClrTx/>
-              <a:buSzTx/>
-              <a:buFontTx/>
-              <a:buNone/>
-              <a:tabLst/>
-              <a:defRPr/>
-            </a:pPr>
-            <a:r>
-              <a:rPr lang="en-US" sz="1200" dirty="0">
-                <a:solidFill>
-                  <a:srgbClr val="C00000"/>
-                </a:solidFill>
-              </a:rPr>
-              <a:t>Better to have a function .. Read the passed value (check it if needed) and then set the private variable.</a:t>
-            </a:r>
-          </a:p>
-          <a:p>
+              <a:t>Notice the constructor has the same name as the class .. And it does not return a type.  </a:t>
+            </a:r>
             <a:endParaRPr lang="en-US" dirty="0"/>
+          </a:p>
+          <a:p>
+            <a:endParaRPr lang="en-US" dirty="0"/>
+          </a:p>
+          <a:p>
+            <a:r>
+              <a:rPr lang="en-US" dirty="0"/>
+              <a:t>Recall the meaning of the leading underscore which in this case is trivial. (Sometimes we might do validity checking before saving it.)</a:t>
+            </a:r>
+          </a:p>
+          <a:p>
+            <a:r>
+              <a:rPr lang="en-US" dirty="0"/>
+              <a:t>I hope people are underwhelmed with this … When we call the constructor it will set aside memory locations for the private variables and if we tell it to it will assign values to them.</a:t>
+            </a:r>
+          </a:p>
+          <a:p>
+            <a:r>
+              <a:rPr lang="en-US" dirty="0"/>
+              <a:t>In this case we are setting _pin and then using the standard Arduino function called pinMode. Note we have not actually sett the output to a value (yet).</a:t>
+            </a:r>
           </a:p>
         </p:txBody>
       </p:sp>
@@ -2351,7 +2177,7 @@
     </p:spTree>
     <p:extLst>
       <p:ext uri="{BB962C8B-B14F-4D97-AF65-F5344CB8AC3E}">
-        <p14:creationId xmlns:p14="http://schemas.microsoft.com/office/powerpoint/2010/main" val="838898345"/>
+        <p14:creationId xmlns:p14="http://schemas.microsoft.com/office/powerpoint/2010/main" val="3803255201"/>
       </p:ext>
     </p:extLst>
   </p:cSld>
@@ -2407,19 +2233,7 @@
           <a:p>
             <a:r>
               <a:rPr lang="en-US" dirty="0"/>
-              <a:t>Terminology first …. Property vs Method … often misused and yes I do fall into this trap. </a:t>
-            </a:r>
-          </a:p>
-          <a:p>
-            <a:r>
-              <a:rPr lang="en-US" dirty="0"/>
-              <a:t>Basically an object property is something that has a value. The value can be set (written to) or read (obtained from) the object.</a:t>
-            </a:r>
-          </a:p>
-          <a:p>
-            <a:r>
-              <a:rPr lang="en-US" dirty="0"/>
-              <a:t>Compare this to a method which just does something.  Note the update method above has a return type of ‘void’ (you don’t read its value) and also did not need any passed parameter (you don’t set a value).</a:t>
+              <a:t>Again I hope people are underwhelmed with this … the on property is just setting private internal values.</a:t>
             </a:r>
           </a:p>
           <a:p>
@@ -2441,12 +2255,53 @@
               <a:defRPr/>
             </a:pPr>
             <a:r>
-              <a:rPr lang="en-US" dirty="0"/>
-              <a:t>Within the class properties and methods can both be implemented as functions. In some other languages the compiler can help with get and set of properties but not with the Arduino. </a:t>
-            </a:r>
-          </a:p>
-          <a:p>
-            <a:endParaRPr lang="en-US" dirty="0"/>
+              <a:rPr lang="en-US" sz="1200" dirty="0">
+                <a:solidFill>
+                  <a:schemeClr val="tx1"/>
+                </a:solidFill>
+              </a:rPr>
+              <a:t>Inside the shoebox </a:t>
+            </a:r>
+            <a:r>
+              <a:rPr lang="en-US" sz="1200" b="1" dirty="0">
+                <a:solidFill>
+                  <a:srgbClr val="C00000"/>
+                </a:solidFill>
+              </a:rPr>
+              <a:t>on()</a:t>
+            </a:r>
+            <a:r>
+              <a:rPr lang="en-US" sz="1200" dirty="0">
+                <a:solidFill>
+                  <a:schemeClr val="tx1"/>
+                </a:solidFill>
+              </a:rPr>
+              <a:t> is a function that sets the private internal variable </a:t>
+            </a:r>
+            <a:r>
+              <a:rPr lang="en-US" sz="1200" dirty="0">
+                <a:solidFill>
+                  <a:srgbClr val="C00000"/>
+                </a:solidFill>
+              </a:rPr>
+              <a:t>_state </a:t>
+            </a:r>
+            <a:r>
+              <a:rPr lang="en-US" sz="1200" dirty="0">
+                <a:solidFill>
+                  <a:schemeClr val="tx1"/>
+                </a:solidFill>
+              </a:rPr>
+              <a:t>and </a:t>
+            </a:r>
+            <a:r>
+              <a:rPr lang="en-US" sz="1200" dirty="0">
+                <a:solidFill>
+                  <a:srgbClr val="C00000"/>
+                </a:solidFill>
+              </a:rPr>
+              <a:t>_blink</a:t>
+            </a:r>
           </a:p>
           <a:p>
             <a:pPr marL="0" marR="0" lvl="0" indent="0" algn="l" defTabSz="914400" rtl="0" eaLnBrk="1" fontAlgn="auto" latinLnBrk="0" hangingPunct="1">
@@ -2466,41 +2321,91 @@
               <a:tabLst/>
               <a:defRPr/>
             </a:pPr>
-            <a:r>
-              <a:rPr lang="en-US" dirty="0"/>
-              <a:t>The update method is where it all happens. In our main sketch we would call the update method for each object frequently  (in your loop code)</a:t>
-            </a:r>
-          </a:p>
-          <a:p>
-            <a:r>
-              <a:rPr lang="en-US" dirty="0"/>
-              <a:t>Lets go through what update is doing … </a:t>
-            </a:r>
-          </a:p>
-          <a:p>
-            <a:r>
-              <a:rPr lang="en-US" dirty="0"/>
-              <a:t>Talk it through as text box builds up in several stages. </a:t>
-            </a:r>
-          </a:p>
-          <a:p>
-            <a:r>
-              <a:rPr lang="en-US" dirty="0"/>
-              <a:t>Be sure to differentiate between the class definition (the pastry cutter) and the specific object (the mince pie)</a:t>
-            </a:r>
-          </a:p>
-          <a:p>
-            <a:r>
-              <a:rPr lang="en-US" dirty="0"/>
-              <a:t>(ignore the calculation of _</a:t>
-            </a:r>
-            <a:r>
-              <a:rPr lang="en-US" dirty="0" err="1"/>
-              <a:t>nextTime</a:t>
-            </a:r>
-            <a:r>
-              <a:rPr lang="en-US" dirty="0"/>
-              <a:t> until last just to avoid confusing things)   - it uses conditional evaluation</a:t>
+            <a:endParaRPr lang="en-US" sz="1200" dirty="0">
+              <a:solidFill>
+                <a:srgbClr val="C00000"/>
+              </a:solidFill>
+            </a:endParaRPr>
+          </a:p>
+          <a:p>
+            <a:pPr marL="0" marR="0" lvl="0" indent="0" algn="l" defTabSz="914400" rtl="0" eaLnBrk="1" fontAlgn="auto" latinLnBrk="0" hangingPunct="1">
+              <a:lnSpc>
+                <a:spcPct val="100000"/>
+              </a:lnSpc>
+              <a:spcBef>
+                <a:spcPts val="0"/>
+              </a:spcBef>
+              <a:spcAft>
+                <a:spcPts val="0"/>
+              </a:spcAft>
+              <a:buClrTx/>
+              <a:buSzTx/>
+              <a:buFontTx/>
+              <a:buNone/>
+              <a:tabLst/>
+              <a:defRPr/>
+            </a:pPr>
+            <a:r>
+              <a:rPr lang="en-US" sz="1200" dirty="0">
+                <a:solidFill>
+                  <a:srgbClr val="C00000"/>
+                </a:solidFill>
+              </a:rPr>
+              <a:t>I could have just made the state a public variable (not private) and then we could write to it directly.</a:t>
+            </a:r>
+          </a:p>
+          <a:p>
+            <a:pPr marL="0" marR="0" lvl="0" indent="0" algn="l" defTabSz="914400" rtl="0" eaLnBrk="1" fontAlgn="auto" latinLnBrk="0" hangingPunct="1">
+              <a:lnSpc>
+                <a:spcPct val="100000"/>
+              </a:lnSpc>
+              <a:spcBef>
+                <a:spcPts val="0"/>
+              </a:spcBef>
+              <a:spcAft>
+                <a:spcPts val="0"/>
+              </a:spcAft>
+              <a:buClrTx/>
+              <a:buSzTx/>
+              <a:buFontTx/>
+              <a:buNone/>
+              <a:tabLst/>
+              <a:defRPr/>
+            </a:pPr>
+            <a:r>
+              <a:rPr lang="en-US" sz="1200" dirty="0">
+                <a:solidFill>
+                  <a:srgbClr val="C00000"/>
+                </a:solidFill>
+              </a:rPr>
+              <a:t>Generally doing this is a poor idea as doing so does not allow the possibility of error checking and users could enter values you are not expecting.</a:t>
+            </a:r>
+          </a:p>
+          <a:p>
+            <a:pPr marL="0" marR="0" lvl="0" indent="0" algn="l" defTabSz="914400" rtl="0" eaLnBrk="1" fontAlgn="auto" latinLnBrk="0" hangingPunct="1">
+              <a:lnSpc>
+                <a:spcPct val="100000"/>
+              </a:lnSpc>
+              <a:spcBef>
+                <a:spcPts val="0"/>
+              </a:spcBef>
+              <a:spcAft>
+                <a:spcPts val="0"/>
+              </a:spcAft>
+              <a:buClrTx/>
+              <a:buSzTx/>
+              <a:buFontTx/>
+              <a:buNone/>
+              <a:tabLst/>
+              <a:defRPr/>
+            </a:pPr>
+            <a:r>
+              <a:rPr lang="en-US" sz="1200" dirty="0">
+                <a:solidFill>
+                  <a:srgbClr val="C00000"/>
+                </a:solidFill>
+              </a:rPr>
+              <a:t>Better to have a function .. Read the passed value (check it if needed) and then set the private variable.</a:t>
             </a:r>
           </a:p>
           <a:p>
@@ -2534,7 +2439,7 @@
     </p:spTree>
     <p:extLst>
       <p:ext uri="{BB962C8B-B14F-4D97-AF65-F5344CB8AC3E}">
-        <p14:creationId xmlns:p14="http://schemas.microsoft.com/office/powerpoint/2010/main" val="1814358540"/>
+        <p14:creationId xmlns:p14="http://schemas.microsoft.com/office/powerpoint/2010/main" val="838898345"/>
       </p:ext>
     </p:extLst>
   </p:cSld>
@@ -2590,86 +2495,104 @@
           <a:p>
             <a:r>
               <a:rPr lang="en-US" dirty="0"/>
-              <a:t>This is a complete working sketch.</a:t>
+              <a:t>Terminology first …. Property vs Method … often misused and yes I do fall into this trap. </a:t>
+            </a:r>
+          </a:p>
+          <a:p>
+            <a:r>
+              <a:rPr lang="en-US" dirty="0"/>
+              <a:t>Basically an object property is something that has a value. The value can be set (written to) or read (obtained from) the object.</a:t>
+            </a:r>
+          </a:p>
+          <a:p>
+            <a:r>
+              <a:rPr lang="en-US" dirty="0"/>
+              <a:t>Compare this to a method which just does something.  Note the update method above has a return type of ‘void’ (you don’t read its value) and also did not need any passed parameter (you don’t set a value).</a:t>
+            </a:r>
+          </a:p>
+          <a:p>
+            <a:pPr marL="0" marR="0" lvl="0" indent="0" algn="l" defTabSz="914400" rtl="0" eaLnBrk="1" fontAlgn="auto" latinLnBrk="0" hangingPunct="1">
+              <a:lnSpc>
+                <a:spcPct val="100000"/>
+              </a:lnSpc>
+              <a:spcBef>
+                <a:spcPts val="0"/>
+              </a:spcBef>
+              <a:spcAft>
+                <a:spcPts val="0"/>
+              </a:spcAft>
+              <a:buClrTx/>
+              <a:buSzTx/>
+              <a:buFontTx/>
+              <a:buNone/>
+              <a:tabLst/>
+              <a:defRPr/>
+            </a:pPr>
+            <a:r>
+              <a:rPr lang="en-US" dirty="0"/>
+              <a:t>Within the class properties and methods can both be implemented as functions. In some other languages the compiler can help with get and set of properties but not with the Arduino. </a:t>
             </a:r>
           </a:p>
           <a:p>
             <a:endParaRPr lang="en-US" dirty="0"/>
           </a:p>
           <a:p>
+            <a:pPr marL="0" marR="0" lvl="0" indent="0" algn="l" defTabSz="914400" rtl="0" eaLnBrk="1" fontAlgn="auto" latinLnBrk="0" hangingPunct="1">
+              <a:lnSpc>
+                <a:spcPct val="100000"/>
+              </a:lnSpc>
+              <a:spcBef>
+                <a:spcPts val="0"/>
+              </a:spcBef>
+              <a:spcAft>
+                <a:spcPts val="0"/>
+              </a:spcAft>
+              <a:buClrTx/>
+              <a:buSzTx/>
+              <a:buFontTx/>
+              <a:buNone/>
+              <a:tabLst/>
+              <a:defRPr/>
+            </a:pPr>
             <a:r>
               <a:rPr lang="en-US" dirty="0"/>
-              <a:t>In part two we will spend time to go through this and take a look at the code inside the shoebox (including other properties not shown)</a:t>
+              <a:t>The update method is where it all happens. In our main sketch we would call the update method for each object frequently  (in your loop code)</a:t>
             </a:r>
           </a:p>
           <a:p>
             <a:r>
               <a:rPr lang="en-US" dirty="0"/>
-              <a:t>The above is actually a bit of a tease because so far we did not talk about setting the </a:t>
+              <a:t>Lets go through what update is doing … </a:t>
+            </a:r>
+          </a:p>
+          <a:p>
+            <a:r>
+              <a:rPr lang="en-US" dirty="0"/>
+              <a:t>Talk it through as text box builds up in several stages. </a:t>
+            </a:r>
+          </a:p>
+          <a:p>
+            <a:r>
+              <a:rPr lang="en-US" dirty="0"/>
+              <a:t>Be sure to differentiate between the class definition (the pastry cutter) and the specific object (the mince pie)</a:t>
+            </a:r>
+          </a:p>
+          <a:p>
+            <a:r>
+              <a:rPr lang="en-US" dirty="0"/>
+              <a:t>(ignore the calculation of _</a:t>
             </a:r>
             <a:r>
               <a:rPr lang="en-US" dirty="0" err="1"/>
-              <a:t>onTime</a:t>
+              <a:t>nextTime</a:t>
             </a:r>
             <a:r>
               <a:rPr lang="en-US" dirty="0"/>
-              <a:t> or the </a:t>
-            </a:r>
-            <a:r>
-              <a:rPr lang="en-US" dirty="0" err="1"/>
-              <a:t>offTime</a:t>
-            </a:r>
-            <a:r>
-              <a:rPr lang="en-US" dirty="0"/>
-              <a:t> as shown.</a:t>
+              <a:t> until last just to avoid confusing things)   - it uses conditional evaluation</a:t>
             </a:r>
           </a:p>
           <a:p>
             <a:endParaRPr lang="en-US" dirty="0"/>
-          </a:p>
-          <a:p>
-            <a:r>
-              <a:rPr lang="en-US" dirty="0"/>
-              <a:t>Main reason for showing this now is to emphasize the point that using an object oriented approach simplifies your code</a:t>
-            </a:r>
-          </a:p>
-          <a:p>
-            <a:r>
-              <a:rPr lang="en-US" dirty="0"/>
-              <a:t>The nitty gritty internal workings (the complex stuff) is hidden inside the class and the objects we create … but we don’t need to know how they work unless we want to</a:t>
-            </a:r>
-          </a:p>
-          <a:p>
-            <a:r>
-              <a:rPr lang="en-US" dirty="0"/>
-              <a:t>Hopefully you will agree that our ability to comprehend what this sketch does is much simplified.   We do not need to know about </a:t>
-            </a:r>
-            <a:r>
-              <a:rPr lang="en-US" dirty="0" err="1"/>
-              <a:t>millis</a:t>
-            </a:r>
-            <a:r>
-              <a:rPr lang="en-US" dirty="0"/>
-              <a:t> … and time delays</a:t>
-            </a:r>
-          </a:p>
-          <a:p>
-            <a:r>
-              <a:rPr lang="en-US" dirty="0"/>
-              <a:t>Also you should see that I can create as many objects as I need .. Using different pins for outputs .. </a:t>
-            </a:r>
-          </a:p>
-          <a:p>
-            <a:r>
-              <a:rPr lang="en-US" dirty="0"/>
-              <a:t>The blink rate of them all is quite independent and does not  block or hang up the loop code in any way. </a:t>
-            </a:r>
-          </a:p>
-          <a:p>
-            <a:r>
-              <a:rPr lang="en-US" dirty="0"/>
-              <a:t>The loop code could easily be calling the update method on 3 LED’s and a Servo to boot (in just 4 lines of code in the loop)</a:t>
-            </a:r>
           </a:p>
         </p:txBody>
       </p:sp>
@@ -2699,7 +2622,7 @@
     </p:spTree>
     <p:extLst>
       <p:ext uri="{BB962C8B-B14F-4D97-AF65-F5344CB8AC3E}">
-        <p14:creationId xmlns:p14="http://schemas.microsoft.com/office/powerpoint/2010/main" val="3672330066"/>
+        <p14:creationId xmlns:p14="http://schemas.microsoft.com/office/powerpoint/2010/main" val="1814358540"/>
       </p:ext>
     </p:extLst>
   </p:cSld>
@@ -2755,7 +2678,85 @@
           <a:p>
             <a:r>
               <a:rPr lang="en-US" dirty="0"/>
-              <a:t>Getting near the end … making my case.</a:t>
+              <a:t>This is a complete working sketch.</a:t>
+            </a:r>
+          </a:p>
+          <a:p>
+            <a:endParaRPr lang="en-US" dirty="0"/>
+          </a:p>
+          <a:p>
+            <a:r>
+              <a:rPr lang="en-US" dirty="0"/>
+              <a:t>In part two we will spend time to go through this and take a look at the code inside the shoebox (including other properties not shown)</a:t>
+            </a:r>
+          </a:p>
+          <a:p>
+            <a:r>
+              <a:rPr lang="en-US" dirty="0"/>
+              <a:t>The above is actually a bit of a tease because so far we did not talk about setting the </a:t>
+            </a:r>
+            <a:r>
+              <a:rPr lang="en-US" dirty="0" err="1"/>
+              <a:t>onTime</a:t>
+            </a:r>
+            <a:r>
+              <a:rPr lang="en-US" dirty="0"/>
+              <a:t> or the </a:t>
+            </a:r>
+            <a:r>
+              <a:rPr lang="en-US" dirty="0" err="1"/>
+              <a:t>offTime</a:t>
+            </a:r>
+            <a:r>
+              <a:rPr lang="en-US" dirty="0"/>
+              <a:t> as shown.</a:t>
+            </a:r>
+          </a:p>
+          <a:p>
+            <a:endParaRPr lang="en-US" dirty="0"/>
+          </a:p>
+          <a:p>
+            <a:r>
+              <a:rPr lang="en-US" dirty="0"/>
+              <a:t>Main reason for showing this now is to emphasize the point that using an object oriented approach simplifies your code</a:t>
+            </a:r>
+          </a:p>
+          <a:p>
+            <a:r>
+              <a:rPr lang="en-US" dirty="0"/>
+              <a:t>The nitty gritty internal workings (the complex stuff) is hidden inside the class and the objects we create … but we don’t need to know how they work unless we want to</a:t>
+            </a:r>
+          </a:p>
+          <a:p>
+            <a:r>
+              <a:rPr lang="en-US" dirty="0"/>
+              <a:t>Hopefully you will agree that our ability to comprehend what this sketch does is much simplified.   We do not need to know about </a:t>
+            </a:r>
+            <a:r>
+              <a:rPr lang="en-US" dirty="0" err="1"/>
+              <a:t>millis</a:t>
+            </a:r>
+            <a:r>
+              <a:rPr lang="en-US" dirty="0"/>
+              <a:t> … and time delays</a:t>
+            </a:r>
+          </a:p>
+          <a:p>
+            <a:r>
+              <a:rPr lang="en-US" dirty="0"/>
+              <a:t>Also you should see that I can create as many objects as I need .. Using different pins for outputs .. </a:t>
+            </a:r>
+          </a:p>
+          <a:p>
+            <a:r>
+              <a:rPr lang="en-US" dirty="0"/>
+              <a:t>The blink rate of them all is quite independent and does not  block or hang up the loop code in any way. </a:t>
+            </a:r>
+          </a:p>
+          <a:p>
+            <a:r>
+              <a:rPr lang="en-US" dirty="0"/>
+              <a:t>The loop code could easily be calling the update method on 3 LED’s and a Servo to boot (in just 4 lines of code in the loop)</a:t>
             </a:r>
           </a:p>
         </p:txBody>
@@ -2786,7 +2787,7 @@
     </p:spTree>
     <p:extLst>
       <p:ext uri="{BB962C8B-B14F-4D97-AF65-F5344CB8AC3E}">
-        <p14:creationId xmlns:p14="http://schemas.microsoft.com/office/powerpoint/2010/main" val="2123008306"/>
+        <p14:creationId xmlns:p14="http://schemas.microsoft.com/office/powerpoint/2010/main" val="3672330066"/>
       </p:ext>
     </p:extLst>
   </p:cSld>
@@ -2842,13 +2843,7 @@
           <a:p>
             <a:r>
               <a:rPr lang="en-US" dirty="0"/>
-              <a:t>Talk to each line one at a time</a:t>
-            </a:r>
-          </a:p>
-          <a:p>
-            <a:r>
-              <a:rPr lang="en-US" dirty="0"/>
-              <a:t>There may be others but I cant think of them.</a:t>
+              <a:t>Getting near the end … making my case.</a:t>
             </a:r>
           </a:p>
         </p:txBody>
@@ -2879,7 +2874,7 @@
     </p:spTree>
     <p:extLst>
       <p:ext uri="{BB962C8B-B14F-4D97-AF65-F5344CB8AC3E}">
-        <p14:creationId xmlns:p14="http://schemas.microsoft.com/office/powerpoint/2010/main" val="2915098035"/>
+        <p14:creationId xmlns:p14="http://schemas.microsoft.com/office/powerpoint/2010/main" val="2123008306"/>
       </p:ext>
     </p:extLst>
   </p:cSld>
@@ -2935,34 +2930,14 @@
           <a:p>
             <a:r>
               <a:rPr lang="en-US" dirty="0"/>
-              <a:t>In the interest of a balance there are reasons not to use classes (object oriented programming)</a:t>
-            </a:r>
-          </a:p>
-          <a:p>
-            <a:pPr marL="0" marR="0" lvl="0" indent="0" algn="l" defTabSz="914400" rtl="0" eaLnBrk="1" fontAlgn="auto" latinLnBrk="0" hangingPunct="1">
-              <a:lnSpc>
-                <a:spcPct val="100000"/>
-              </a:lnSpc>
-              <a:spcBef>
-                <a:spcPts val="0"/>
-              </a:spcBef>
-              <a:spcAft>
-                <a:spcPts val="0"/>
-              </a:spcAft>
-              <a:buClrTx/>
-              <a:buSzTx/>
-              <a:buFontTx/>
-              <a:buNone/>
-              <a:tabLst/>
-              <a:defRPr/>
-            </a:pPr>
-            <a:r>
-              <a:rPr lang="en-US" sz="1200" dirty="0"/>
-              <a:t>Classes are still programs and programs can have bugs in them.</a:t>
-            </a:r>
-          </a:p>
-          <a:p>
-            <a:endParaRPr lang="en-US" dirty="0"/>
+              <a:t>Talk to each line one at a time</a:t>
+            </a:r>
+          </a:p>
+          <a:p>
+            <a:r>
+              <a:rPr lang="en-US" dirty="0"/>
+              <a:t>There may be others but I cant think of them.</a:t>
+            </a:r>
           </a:p>
         </p:txBody>
       </p:sp>
@@ -2992,7 +2967,7 @@
     </p:spTree>
     <p:extLst>
       <p:ext uri="{BB962C8B-B14F-4D97-AF65-F5344CB8AC3E}">
-        <p14:creationId xmlns:p14="http://schemas.microsoft.com/office/powerpoint/2010/main" val="4073683208"/>
+        <p14:creationId xmlns:p14="http://schemas.microsoft.com/office/powerpoint/2010/main" val="2915098035"/>
       </p:ext>
     </p:extLst>
   </p:cSld>
@@ -3048,20 +3023,34 @@
           <a:p>
             <a:r>
               <a:rPr lang="en-US" dirty="0"/>
-              <a:t>Slide builds up.</a:t>
-            </a:r>
-          </a:p>
-          <a:p>
-            <a:r>
-              <a:rPr lang="en-US" dirty="0"/>
-              <a:t>The last point … is to emphasize that nobody is born knowing this stuff.  It is all learned and if you are curious enough and ask enough questions it all can be learned.</a:t>
-            </a:r>
-          </a:p>
-          <a:p>
-            <a:r>
-              <a:rPr lang="en-US" dirty="0"/>
-              <a:t>  </a:t>
-            </a:r>
+              <a:t>In the interest of a balance there are reasons not to use classes (object oriented programming)</a:t>
+            </a:r>
+          </a:p>
+          <a:p>
+            <a:pPr marL="0" marR="0" lvl="0" indent="0" algn="l" defTabSz="914400" rtl="0" eaLnBrk="1" fontAlgn="auto" latinLnBrk="0" hangingPunct="1">
+              <a:lnSpc>
+                <a:spcPct val="100000"/>
+              </a:lnSpc>
+              <a:spcBef>
+                <a:spcPts val="0"/>
+              </a:spcBef>
+              <a:spcAft>
+                <a:spcPts val="0"/>
+              </a:spcAft>
+              <a:buClrTx/>
+              <a:buSzTx/>
+              <a:buFontTx/>
+              <a:buNone/>
+              <a:tabLst/>
+              <a:defRPr/>
+            </a:pPr>
+            <a:r>
+              <a:rPr lang="en-US" sz="1200" dirty="0"/>
+              <a:t>Classes are still programs and programs can have bugs in them.</a:t>
+            </a:r>
+          </a:p>
+          <a:p>
+            <a:endParaRPr lang="en-US" dirty="0"/>
           </a:p>
         </p:txBody>
       </p:sp>
@@ -3091,7 +3080,7 @@
     </p:spTree>
     <p:extLst>
       <p:ext uri="{BB962C8B-B14F-4D97-AF65-F5344CB8AC3E}">
-        <p14:creationId xmlns:p14="http://schemas.microsoft.com/office/powerpoint/2010/main" val="4237062884"/>
+        <p14:creationId xmlns:p14="http://schemas.microsoft.com/office/powerpoint/2010/main" val="4073683208"/>
       </p:ext>
     </p:extLst>
   </p:cSld>
@@ -3145,6 +3134,105 @@
           <a:bodyPr/>
           <a:lstStyle/>
           <a:p>
+            <a:r>
+              <a:rPr lang="en-US" dirty="0"/>
+              <a:t>Slide builds up.</a:t>
+            </a:r>
+          </a:p>
+          <a:p>
+            <a:r>
+              <a:rPr lang="en-US" dirty="0"/>
+              <a:t>The last point … is to emphasize that nobody is born knowing this stuff.  It is all learned and if you are curious enough and ask enough questions it all can be learned.</a:t>
+            </a:r>
+          </a:p>
+          <a:p>
+            <a:r>
+              <a:rPr lang="en-US" dirty="0"/>
+              <a:t>  </a:t>
+            </a:r>
+          </a:p>
+        </p:txBody>
+      </p:sp>
+      <p:sp>
+        <p:nvSpPr>
+          <p:cNvPr id="4" name="Slide Number Placeholder 3"/>
+          <p:cNvSpPr>
+            <a:spLocks noGrp="1"/>
+          </p:cNvSpPr>
+          <p:nvPr>
+            <p:ph type="sldNum" sz="quarter" idx="5"/>
+          </p:nvPr>
+        </p:nvSpPr>
+        <p:spPr/>
+        <p:txBody>
+          <a:bodyPr/>
+          <a:lstStyle/>
+          <a:p>
+            <a:fld id="{AF533E96-F078-4B3D-A8F4-F1AF21EBC357}" type="slidenum">
+              <a:rPr lang="en-US" smtClean="0"/>
+              <a:t>30</a:t>
+            </a:fld>
+            <a:endParaRPr lang="en-US"/>
+          </a:p>
+        </p:txBody>
+      </p:sp>
+    </p:spTree>
+    <p:extLst>
+      <p:ext uri="{BB962C8B-B14F-4D97-AF65-F5344CB8AC3E}">
+        <p14:creationId xmlns:p14="http://schemas.microsoft.com/office/powerpoint/2010/main" val="4237062884"/>
+      </p:ext>
+    </p:extLst>
+  </p:cSld>
+  <p:clrMapOvr>
+    <a:masterClrMapping/>
+  </p:clrMapOvr>
+</p:notes>
+</file>
+
+<file path=ppt/notesSlides/notesSlide29.xml><?xml version="1.0" encoding="utf-8"?>
+<p:notes xmlns:a="http://schemas.openxmlformats.org/drawingml/2006/main" xmlns:r="http://schemas.openxmlformats.org/officeDocument/2006/relationships" xmlns:p="http://schemas.openxmlformats.org/presentationml/2006/main">
+  <p:cSld>
+    <p:spTree>
+      <p:nvGrpSpPr>
+        <p:cNvPr id="1" name=""/>
+        <p:cNvGrpSpPr/>
+        <p:nvPr/>
+      </p:nvGrpSpPr>
+      <p:grpSpPr>
+        <a:xfrm>
+          <a:off x="0" y="0"/>
+          <a:ext cx="0" cy="0"/>
+          <a:chOff x="0" y="0"/>
+          <a:chExt cx="0" cy="0"/>
+        </a:xfrm>
+      </p:grpSpPr>
+      <p:sp>
+        <p:nvSpPr>
+          <p:cNvPr id="2" name="Slide Image Placeholder 1"/>
+          <p:cNvSpPr>
+            <a:spLocks noGrp="1" noRot="1" noChangeAspect="1"/>
+          </p:cNvSpPr>
+          <p:nvPr>
+            <p:ph type="sldImg"/>
+          </p:nvPr>
+        </p:nvSpPr>
+        <p:spPr/>
+      </p:sp>
+      <p:sp>
+        <p:nvSpPr>
+          <p:cNvPr id="3" name="Notes Placeholder 2"/>
+          <p:cNvSpPr>
+            <a:spLocks noGrp="1"/>
+          </p:cNvSpPr>
+          <p:nvPr>
+            <p:ph type="body" idx="1"/>
+          </p:nvPr>
+        </p:nvSpPr>
+        <p:spPr/>
+        <p:txBody>
+          <a:bodyPr/>
+          <a:lstStyle/>
+          <a:p>
             <a:pPr marL="0" marR="0" lvl="0" indent="0" algn="l" defTabSz="914400" rtl="0" eaLnBrk="1" fontAlgn="auto" latinLnBrk="0" hangingPunct="1">
               <a:lnSpc>
                 <a:spcPct val="100000"/>
@@ -3189,7 +3277,7 @@
           <a:p>
             <a:fld id="{AF533E96-F078-4B3D-A8F4-F1AF21EBC357}" type="slidenum">
               <a:rPr lang="en-US" smtClean="0"/>
-              <a:t>30</a:t>
+              <a:t>31</a:t>
             </a:fld>
             <a:endParaRPr lang="en-US"/>
           </a:p>
@@ -3208,7 +3296,106 @@
 </p:notes>
 </file>
 
-<file path=ppt/notesSlides/notesSlide29.xml><?xml version="1.0" encoding="utf-8"?>
+<file path=ppt/notesSlides/notesSlide3.xml><?xml version="1.0" encoding="utf-8"?>
+<p:notes xmlns:a="http://schemas.openxmlformats.org/drawingml/2006/main" xmlns:r="http://schemas.openxmlformats.org/officeDocument/2006/relationships" xmlns:p="http://schemas.openxmlformats.org/presentationml/2006/main">
+  <p:cSld>
+    <p:spTree>
+      <p:nvGrpSpPr>
+        <p:cNvPr id="1" name=""/>
+        <p:cNvGrpSpPr/>
+        <p:nvPr/>
+      </p:nvGrpSpPr>
+      <p:grpSpPr>
+        <a:xfrm>
+          <a:off x="0" y="0"/>
+          <a:ext cx="0" cy="0"/>
+          <a:chOff x="0" y="0"/>
+          <a:chExt cx="0" cy="0"/>
+        </a:xfrm>
+      </p:grpSpPr>
+      <p:sp>
+        <p:nvSpPr>
+          <p:cNvPr id="2" name="Slide Image Placeholder 1"/>
+          <p:cNvSpPr>
+            <a:spLocks noGrp="1" noRot="1" noChangeAspect="1"/>
+          </p:cNvSpPr>
+          <p:nvPr>
+            <p:ph type="sldImg"/>
+          </p:nvPr>
+        </p:nvSpPr>
+        <p:spPr/>
+      </p:sp>
+      <p:sp>
+        <p:nvSpPr>
+          <p:cNvPr id="3" name="Notes Placeholder 2"/>
+          <p:cNvSpPr>
+            <a:spLocks noGrp="1"/>
+          </p:cNvSpPr>
+          <p:nvPr>
+            <p:ph type="body" idx="1"/>
+          </p:nvPr>
+        </p:nvSpPr>
+        <p:spPr/>
+        <p:txBody>
+          <a:bodyPr/>
+          <a:lstStyle/>
+          <a:p>
+            <a:r>
+              <a:rPr lang="en-US" dirty="0"/>
+              <a:t>Introductions – a little bit about myself!</a:t>
+            </a:r>
+          </a:p>
+          <a:p>
+            <a:r>
+              <a:rPr lang="en-US" dirty="0"/>
+              <a:t>Train connections run deep in the family.</a:t>
+            </a:r>
+          </a:p>
+          <a:p>
+            <a:r>
+              <a:rPr lang="en-US" dirty="0"/>
+              <a:t>Living in Canada now but I was born in Widnes and my Grandad drove steam engines (heavy freight) for his whole life.</a:t>
+            </a:r>
+          </a:p>
+        </p:txBody>
+      </p:sp>
+      <p:sp>
+        <p:nvSpPr>
+          <p:cNvPr id="4" name="Slide Number Placeholder 3"/>
+          <p:cNvSpPr>
+            <a:spLocks noGrp="1"/>
+          </p:cNvSpPr>
+          <p:nvPr>
+            <p:ph type="sldNum" sz="quarter" idx="5"/>
+          </p:nvPr>
+        </p:nvSpPr>
+        <p:spPr/>
+        <p:txBody>
+          <a:bodyPr/>
+          <a:lstStyle/>
+          <a:p>
+            <a:fld id="{AF533E96-F078-4B3D-A8F4-F1AF21EBC357}" type="slidenum">
+              <a:rPr lang="en-US" smtClean="0"/>
+              <a:t>3</a:t>
+            </a:fld>
+            <a:endParaRPr lang="en-US"/>
+          </a:p>
+        </p:txBody>
+      </p:sp>
+    </p:spTree>
+    <p:extLst>
+      <p:ext uri="{BB962C8B-B14F-4D97-AF65-F5344CB8AC3E}">
+        <p14:creationId xmlns:p14="http://schemas.microsoft.com/office/powerpoint/2010/main" val="21146119"/>
+      </p:ext>
+    </p:extLst>
+  </p:cSld>
+  <p:clrMapOvr>
+    <a:masterClrMapping/>
+  </p:clrMapOvr>
+</p:notes>
+</file>
+
+<file path=ppt/notesSlides/notesSlide30.xml><?xml version="1.0" encoding="utf-8"?>
 <p:notes xmlns:a="http://schemas.openxmlformats.org/drawingml/2006/main" xmlns:r="http://schemas.openxmlformats.org/officeDocument/2006/relationships" xmlns:p="http://schemas.openxmlformats.org/presentationml/2006/main">
   <p:cSld>
     <p:spTree>
@@ -3297,7 +3484,7 @@
                 <a:tabLst/>
                 <a:defRPr/>
               </a:pPr>
-              <a:t>31</a:t>
+              <a:t>32</a:t>
             </a:fld>
             <a:endParaRPr kumimoji="0" lang="en-US" altLang="en-US" sz="1200" b="0" i="0" u="none" strike="noStrike" kern="1200" cap="none" spc="0" normalizeH="0" baseline="0" noProof="0">
               <a:ln>
@@ -3416,198 +3603,6 @@
         </p:txBody>
       </p:sp>
     </p:spTree>
-  </p:cSld>
-  <p:clrMapOvr>
-    <a:masterClrMapping/>
-  </p:clrMapOvr>
-</p:notes>
-</file>
-
-<file path=ppt/notesSlides/notesSlide3.xml><?xml version="1.0" encoding="utf-8"?>
-<p:notes xmlns:a="http://schemas.openxmlformats.org/drawingml/2006/main" xmlns:r="http://schemas.openxmlformats.org/officeDocument/2006/relationships" xmlns:p="http://schemas.openxmlformats.org/presentationml/2006/main">
-  <p:cSld>
-    <p:spTree>
-      <p:nvGrpSpPr>
-        <p:cNvPr id="1" name=""/>
-        <p:cNvGrpSpPr/>
-        <p:nvPr/>
-      </p:nvGrpSpPr>
-      <p:grpSpPr>
-        <a:xfrm>
-          <a:off x="0" y="0"/>
-          <a:ext cx="0" cy="0"/>
-          <a:chOff x="0" y="0"/>
-          <a:chExt cx="0" cy="0"/>
-        </a:xfrm>
-      </p:grpSpPr>
-      <p:sp>
-        <p:nvSpPr>
-          <p:cNvPr id="2" name="Slide Image Placeholder 1"/>
-          <p:cNvSpPr>
-            <a:spLocks noGrp="1" noRot="1" noChangeAspect="1"/>
-          </p:cNvSpPr>
-          <p:nvPr>
-            <p:ph type="sldImg"/>
-          </p:nvPr>
-        </p:nvSpPr>
-        <p:spPr/>
-      </p:sp>
-      <p:sp>
-        <p:nvSpPr>
-          <p:cNvPr id="3" name="Notes Placeholder 2"/>
-          <p:cNvSpPr>
-            <a:spLocks noGrp="1"/>
-          </p:cNvSpPr>
-          <p:nvPr>
-            <p:ph type="body" idx="1"/>
-          </p:nvPr>
-        </p:nvSpPr>
-        <p:spPr/>
-        <p:txBody>
-          <a:bodyPr/>
-          <a:lstStyle/>
-          <a:p>
-            <a:r>
-              <a:rPr lang="en-US" dirty="0"/>
-              <a:t>Introductions – a little bit about myself!</a:t>
-            </a:r>
-          </a:p>
-          <a:p>
-            <a:r>
-              <a:rPr lang="en-US" dirty="0"/>
-              <a:t>Train connections run deep in the family.</a:t>
-            </a:r>
-          </a:p>
-          <a:p>
-            <a:r>
-              <a:rPr lang="en-US" dirty="0"/>
-              <a:t>Living in Canada now but I was born in Widnes and my Grandad drove steam engines for his whole life.</a:t>
-            </a:r>
-          </a:p>
-        </p:txBody>
-      </p:sp>
-      <p:sp>
-        <p:nvSpPr>
-          <p:cNvPr id="4" name="Slide Number Placeholder 3"/>
-          <p:cNvSpPr>
-            <a:spLocks noGrp="1"/>
-          </p:cNvSpPr>
-          <p:nvPr>
-            <p:ph type="sldNum" sz="quarter" idx="5"/>
-          </p:nvPr>
-        </p:nvSpPr>
-        <p:spPr/>
-        <p:txBody>
-          <a:bodyPr/>
-          <a:lstStyle/>
-          <a:p>
-            <a:fld id="{AF533E96-F078-4B3D-A8F4-F1AF21EBC357}" type="slidenum">
-              <a:rPr lang="en-US" smtClean="0"/>
-              <a:t>3</a:t>
-            </a:fld>
-            <a:endParaRPr lang="en-US"/>
-          </a:p>
-        </p:txBody>
-      </p:sp>
-    </p:spTree>
-    <p:extLst>
-      <p:ext uri="{BB962C8B-B14F-4D97-AF65-F5344CB8AC3E}">
-        <p14:creationId xmlns:p14="http://schemas.microsoft.com/office/powerpoint/2010/main" val="21146119"/>
-      </p:ext>
-    </p:extLst>
-  </p:cSld>
-  <p:clrMapOvr>
-    <a:masterClrMapping/>
-  </p:clrMapOvr>
-</p:notes>
-</file>
-
-<file path=ppt/notesSlides/notesSlide30.xml><?xml version="1.0" encoding="utf-8"?>
-<p:notes xmlns:a="http://schemas.openxmlformats.org/drawingml/2006/main" xmlns:r="http://schemas.openxmlformats.org/officeDocument/2006/relationships" xmlns:p="http://schemas.openxmlformats.org/presentationml/2006/main">
-  <p:cSld>
-    <p:spTree>
-      <p:nvGrpSpPr>
-        <p:cNvPr id="1" name=""/>
-        <p:cNvGrpSpPr/>
-        <p:nvPr/>
-      </p:nvGrpSpPr>
-      <p:grpSpPr>
-        <a:xfrm>
-          <a:off x="0" y="0"/>
-          <a:ext cx="0" cy="0"/>
-          <a:chOff x="0" y="0"/>
-          <a:chExt cx="0" cy="0"/>
-        </a:xfrm>
-      </p:grpSpPr>
-      <p:sp>
-        <p:nvSpPr>
-          <p:cNvPr id="2" name="Slide Image Placeholder 1"/>
-          <p:cNvSpPr>
-            <a:spLocks noGrp="1" noRot="1" noChangeAspect="1"/>
-          </p:cNvSpPr>
-          <p:nvPr>
-            <p:ph type="sldImg"/>
-          </p:nvPr>
-        </p:nvSpPr>
-        <p:spPr/>
-      </p:sp>
-      <p:sp>
-        <p:nvSpPr>
-          <p:cNvPr id="3" name="Notes Placeholder 2"/>
-          <p:cNvSpPr>
-            <a:spLocks noGrp="1"/>
-          </p:cNvSpPr>
-          <p:nvPr>
-            <p:ph type="body" idx="1"/>
-          </p:nvPr>
-        </p:nvSpPr>
-        <p:spPr/>
-        <p:txBody>
-          <a:bodyPr/>
-          <a:lstStyle/>
-          <a:p>
-            <a:r>
-              <a:rPr lang="en-US" dirty="0"/>
-              <a:t>Show people that this can be about modelling on railways. </a:t>
-            </a:r>
-          </a:p>
-          <a:p>
-            <a:r>
-              <a:rPr lang="en-US" dirty="0"/>
-              <a:t>It is not just deep in the weeds Arduino programming.</a:t>
-            </a:r>
-          </a:p>
-        </p:txBody>
-      </p:sp>
-      <p:sp>
-        <p:nvSpPr>
-          <p:cNvPr id="4" name="Slide Number Placeholder 3"/>
-          <p:cNvSpPr>
-            <a:spLocks noGrp="1"/>
-          </p:cNvSpPr>
-          <p:nvPr>
-            <p:ph type="sldNum" sz="quarter" idx="5"/>
-          </p:nvPr>
-        </p:nvSpPr>
-        <p:spPr/>
-        <p:txBody>
-          <a:bodyPr/>
-          <a:lstStyle/>
-          <a:p>
-            <a:fld id="{AF533E96-F078-4B3D-A8F4-F1AF21EBC357}" type="slidenum">
-              <a:rPr lang="en-US" smtClean="0"/>
-              <a:t>34</a:t>
-            </a:fld>
-            <a:endParaRPr lang="en-US"/>
-          </a:p>
-        </p:txBody>
-      </p:sp>
-    </p:spTree>
-    <p:extLst>
-      <p:ext uri="{BB962C8B-B14F-4D97-AF65-F5344CB8AC3E}">
-        <p14:creationId xmlns:p14="http://schemas.microsoft.com/office/powerpoint/2010/main" val="3999725060"/>
-      </p:ext>
-    </p:extLst>
   </p:cSld>
   <p:clrMapOvr>
     <a:masterClrMapping/>
@@ -3661,34 +3656,13 @@
           <a:p>
             <a:r>
               <a:rPr lang="en-US" dirty="0"/>
-              <a:t>User interface – 5 buttons .. One speed control potentiometer one LCD screen (With 6 separate data regions showing 6 status items) 3 LED’s for when turntable bridge is in a specific position.</a:t>
+              <a:t>Show people that this can be about modelling on railways. </a:t>
             </a:r>
           </a:p>
           <a:p>
             <a:r>
               <a:rPr lang="en-US" dirty="0"/>
-              <a:t>Other Inputs – 3 HALL effect sensors on outside of turntable well … detect micro magnets attached to each end of the bridge as it rotates.</a:t>
-            </a:r>
-          </a:p>
-          <a:p>
-            <a:r>
-              <a:rPr lang="en-US" dirty="0"/>
-              <a:t>Other outputs – DC motor control direction and speed control.</a:t>
-            </a:r>
-          </a:p>
-          <a:p>
-            <a:r>
-              <a:rPr lang="en-US" dirty="0"/>
-              <a:t>Logic – depending on button press move in the correct direction until hall effect sensor is detected.</a:t>
-            </a:r>
-          </a:p>
-          <a:p>
-            <a:endParaRPr lang="en-US" dirty="0"/>
-          </a:p>
-          <a:p>
-            <a:r>
-              <a:rPr lang="en-US" dirty="0"/>
-              <a:t>All controlled by one Arduino NANO.</a:t>
+              <a:t>It is not just deep in the weeds Arduino programming.</a:t>
             </a:r>
           </a:p>
         </p:txBody>
@@ -3719,7 +3693,7 @@
     </p:spTree>
     <p:extLst>
       <p:ext uri="{BB962C8B-B14F-4D97-AF65-F5344CB8AC3E}">
-        <p14:creationId xmlns:p14="http://schemas.microsoft.com/office/powerpoint/2010/main" val="1631638723"/>
+        <p14:creationId xmlns:p14="http://schemas.microsoft.com/office/powerpoint/2010/main" val="3999725060"/>
       </p:ext>
     </p:extLst>
   </p:cSld>
@@ -3773,6 +3747,120 @@
           <a:bodyPr/>
           <a:lstStyle/>
           <a:p>
+            <a:r>
+              <a:rPr lang="en-US" dirty="0"/>
+              <a:t>User interface – 5 buttons .. One speed control potentiometer one LCD screen (With 6 separate data regions showing 6 status items) 3 LED’s for when turntable bridge is in a specific position.</a:t>
+            </a:r>
+          </a:p>
+          <a:p>
+            <a:r>
+              <a:rPr lang="en-US" dirty="0"/>
+              <a:t>Other Inputs – 3 HALL effect sensors on outside of turntable well … detect micro magnets attached to each end of the bridge as it rotates.</a:t>
+            </a:r>
+          </a:p>
+          <a:p>
+            <a:r>
+              <a:rPr lang="en-US" dirty="0"/>
+              <a:t>Other outputs – DC motor control direction and speed control.</a:t>
+            </a:r>
+          </a:p>
+          <a:p>
+            <a:r>
+              <a:rPr lang="en-US" dirty="0"/>
+              <a:t>Logic – depending on button press move in the correct direction until hall effect sensor is detected.</a:t>
+            </a:r>
+          </a:p>
+          <a:p>
+            <a:endParaRPr lang="en-US" dirty="0"/>
+          </a:p>
+          <a:p>
+            <a:r>
+              <a:rPr lang="en-US" dirty="0"/>
+              <a:t>All controlled by one Arduino NANO.</a:t>
+            </a:r>
+          </a:p>
+        </p:txBody>
+      </p:sp>
+      <p:sp>
+        <p:nvSpPr>
+          <p:cNvPr id="4" name="Slide Number Placeholder 3"/>
+          <p:cNvSpPr>
+            <a:spLocks noGrp="1"/>
+          </p:cNvSpPr>
+          <p:nvPr>
+            <p:ph type="sldNum" sz="quarter" idx="5"/>
+          </p:nvPr>
+        </p:nvSpPr>
+        <p:spPr/>
+        <p:txBody>
+          <a:bodyPr/>
+          <a:lstStyle/>
+          <a:p>
+            <a:fld id="{AF533E96-F078-4B3D-A8F4-F1AF21EBC357}" type="slidenum">
+              <a:rPr lang="en-US" smtClean="0"/>
+              <a:t>36</a:t>
+            </a:fld>
+            <a:endParaRPr lang="en-US"/>
+          </a:p>
+        </p:txBody>
+      </p:sp>
+    </p:spTree>
+    <p:extLst>
+      <p:ext uri="{BB962C8B-B14F-4D97-AF65-F5344CB8AC3E}">
+        <p14:creationId xmlns:p14="http://schemas.microsoft.com/office/powerpoint/2010/main" val="1631638723"/>
+      </p:ext>
+    </p:extLst>
+  </p:cSld>
+  <p:clrMapOvr>
+    <a:masterClrMapping/>
+  </p:clrMapOvr>
+</p:notes>
+</file>
+
+<file path=ppt/notesSlides/notesSlide33.xml><?xml version="1.0" encoding="utf-8"?>
+<p:notes xmlns:a="http://schemas.openxmlformats.org/drawingml/2006/main" xmlns:r="http://schemas.openxmlformats.org/officeDocument/2006/relationships" xmlns:p="http://schemas.openxmlformats.org/presentationml/2006/main">
+  <p:cSld>
+    <p:spTree>
+      <p:nvGrpSpPr>
+        <p:cNvPr id="1" name=""/>
+        <p:cNvGrpSpPr/>
+        <p:nvPr/>
+      </p:nvGrpSpPr>
+      <p:grpSpPr>
+        <a:xfrm>
+          <a:off x="0" y="0"/>
+          <a:ext cx="0" cy="0"/>
+          <a:chOff x="0" y="0"/>
+          <a:chExt cx="0" cy="0"/>
+        </a:xfrm>
+      </p:grpSpPr>
+      <p:sp>
+        <p:nvSpPr>
+          <p:cNvPr id="2" name="Slide Image Placeholder 1"/>
+          <p:cNvSpPr>
+            <a:spLocks noGrp="1" noRot="1" noChangeAspect="1"/>
+          </p:cNvSpPr>
+          <p:nvPr>
+            <p:ph type="sldImg"/>
+          </p:nvPr>
+        </p:nvSpPr>
+        <p:spPr/>
+      </p:sp>
+      <p:sp>
+        <p:nvSpPr>
+          <p:cNvPr id="3" name="Notes Placeholder 2"/>
+          <p:cNvSpPr>
+            <a:spLocks noGrp="1"/>
+          </p:cNvSpPr>
+          <p:nvPr>
+            <p:ph type="body" idx="1"/>
+          </p:nvPr>
+        </p:nvSpPr>
+        <p:spPr/>
+        <p:txBody>
+          <a:bodyPr/>
+          <a:lstStyle/>
+          <a:p>
             <a:endParaRPr lang="en-US" dirty="0"/>
           </a:p>
         </p:txBody>
@@ -3794,7 +3882,7 @@
           <a:p>
             <a:fld id="{87350B06-B074-48FC-8CFD-53D2CD8FB95F}" type="slidenum">
               <a:rPr lang="en-US" smtClean="0"/>
-              <a:t>36</a:t>
+              <a:t>37</a:t>
             </a:fld>
             <a:endParaRPr lang="en-US"/>
           </a:p>
@@ -4762,7 +4850,7 @@
             <a:fld id="{53074F12-AA26-4AC8-9962-C36BB8F32554}" type="datetimeFigureOut">
               <a:rPr lang="en-US" smtClean="0"/>
               <a:pPr/>
-              <a:t>12/14/2021</a:t>
+              <a:t>12/28/2021</a:t>
             </a:fld>
             <a:endParaRPr lang="en-US"/>
           </a:p>
@@ -5019,7 +5107,7 @@
             <a:fld id="{53074F12-AA26-4AC8-9962-C36BB8F32554}" type="datetimeFigureOut">
               <a:rPr lang="en-US" smtClean="0"/>
               <a:pPr/>
-              <a:t>12/14/2021</a:t>
+              <a:t>12/28/2021</a:t>
             </a:fld>
             <a:endParaRPr lang="en-US"/>
           </a:p>
@@ -5189,7 +5277,7 @@
             <a:fld id="{53074F12-AA26-4AC8-9962-C36BB8F32554}" type="datetimeFigureOut">
               <a:rPr lang="en-US" smtClean="0"/>
               <a:pPr/>
-              <a:t>12/14/2021</a:t>
+              <a:t>12/28/2021</a:t>
             </a:fld>
             <a:endParaRPr lang="en-US"/>
           </a:p>
@@ -5369,7 +5457,7 @@
             <a:fld id="{53074F12-AA26-4AC8-9962-C36BB8F32554}" type="datetimeFigureOut">
               <a:rPr lang="en-US" smtClean="0"/>
               <a:pPr/>
-              <a:t>12/14/2021</a:t>
+              <a:t>12/28/2021</a:t>
             </a:fld>
             <a:endParaRPr lang="en-US"/>
           </a:p>
@@ -7293,7 +7381,7 @@
             <a:fld id="{53074F12-AA26-4AC8-9962-C36BB8F32554}" type="datetimeFigureOut">
               <a:rPr lang="en-US" smtClean="0"/>
               <a:pPr/>
-              <a:t>12/14/2021</a:t>
+              <a:t>12/28/2021</a:t>
             </a:fld>
             <a:endParaRPr lang="en-US"/>
           </a:p>
@@ -8550,7 +8638,7 @@
           <a:p>
             <a:fld id="{43EB6DB1-3762-4EFC-B5CC-AD4013139066}" type="datetimeFigureOut">
               <a:rPr lang="en-US" smtClean="0"/>
-              <a:t>12/14/2021</a:t>
+              <a:t>12/28/2021</a:t>
             </a:fld>
             <a:endParaRPr lang="en-US"/>
           </a:p>
@@ -8748,7 +8836,7 @@
           <a:p>
             <a:fld id="{43EB6DB1-3762-4EFC-B5CC-AD4013139066}" type="datetimeFigureOut">
               <a:rPr lang="en-US" smtClean="0"/>
-              <a:t>12/14/2021</a:t>
+              <a:t>12/28/2021</a:t>
             </a:fld>
             <a:endParaRPr lang="en-US"/>
           </a:p>
@@ -9023,7 +9111,7 @@
           <a:p>
             <a:fld id="{43EB6DB1-3762-4EFC-B5CC-AD4013139066}" type="datetimeFigureOut">
               <a:rPr lang="en-US" smtClean="0"/>
-              <a:t>12/14/2021</a:t>
+              <a:t>12/28/2021</a:t>
             </a:fld>
             <a:endParaRPr lang="en-US"/>
           </a:p>
@@ -9288,7 +9376,7 @@
           <a:p>
             <a:fld id="{43EB6DB1-3762-4EFC-B5CC-AD4013139066}" type="datetimeFigureOut">
               <a:rPr lang="en-US" smtClean="0"/>
-              <a:t>12/14/2021</a:t>
+              <a:t>12/28/2021</a:t>
             </a:fld>
             <a:endParaRPr lang="en-US"/>
           </a:p>
@@ -9700,7 +9788,7 @@
           <a:p>
             <a:fld id="{43EB6DB1-3762-4EFC-B5CC-AD4013139066}" type="datetimeFigureOut">
               <a:rPr lang="en-US" smtClean="0"/>
-              <a:t>12/14/2021</a:t>
+              <a:t>12/28/2021</a:t>
             </a:fld>
             <a:endParaRPr lang="en-US"/>
           </a:p>
@@ -9841,7 +9929,7 @@
           <a:p>
             <a:fld id="{43EB6DB1-3762-4EFC-B5CC-AD4013139066}" type="datetimeFigureOut">
               <a:rPr lang="en-US" smtClean="0"/>
-              <a:t>12/14/2021</a:t>
+              <a:t>12/28/2021</a:t>
             </a:fld>
             <a:endParaRPr lang="en-US"/>
           </a:p>
@@ -10103,7 +10191,7 @@
             <a:fld id="{53074F12-AA26-4AC8-9962-C36BB8F32554}" type="datetimeFigureOut">
               <a:rPr lang="en-US" smtClean="0"/>
               <a:pPr/>
-              <a:t>12/14/2021</a:t>
+              <a:t>12/28/2021</a:t>
             </a:fld>
             <a:endParaRPr lang="en-US"/>
           </a:p>
@@ -10205,7 +10293,7 @@
           <a:p>
             <a:fld id="{43EB6DB1-3762-4EFC-B5CC-AD4013139066}" type="datetimeFigureOut">
               <a:rPr lang="en-US" smtClean="0"/>
-              <a:t>12/14/2021</a:t>
+              <a:t>12/28/2021</a:t>
             </a:fld>
             <a:endParaRPr lang="en-US"/>
           </a:p>
@@ -10516,7 +10604,7 @@
           <a:p>
             <a:fld id="{43EB6DB1-3762-4EFC-B5CC-AD4013139066}" type="datetimeFigureOut">
               <a:rPr lang="en-US" smtClean="0"/>
-              <a:t>12/14/2021</a:t>
+              <a:t>12/28/2021</a:t>
             </a:fld>
             <a:endParaRPr lang="en-US"/>
           </a:p>
@@ -10804,7 +10892,7 @@
           <a:p>
             <a:fld id="{43EB6DB1-3762-4EFC-B5CC-AD4013139066}" type="datetimeFigureOut">
               <a:rPr lang="en-US" smtClean="0"/>
-              <a:t>12/14/2021</a:t>
+              <a:t>12/28/2021</a:t>
             </a:fld>
             <a:endParaRPr lang="en-US"/>
           </a:p>
@@ -11002,7 +11090,7 @@
           <a:p>
             <a:fld id="{43EB6DB1-3762-4EFC-B5CC-AD4013139066}" type="datetimeFigureOut">
               <a:rPr lang="en-US" smtClean="0"/>
-              <a:t>12/14/2021</a:t>
+              <a:t>12/28/2021</a:t>
             </a:fld>
             <a:endParaRPr lang="en-US"/>
           </a:p>
@@ -11210,7 +11298,7 @@
           <a:p>
             <a:fld id="{43EB6DB1-3762-4EFC-B5CC-AD4013139066}" type="datetimeFigureOut">
               <a:rPr lang="en-US" smtClean="0"/>
-              <a:t>12/14/2021</a:t>
+              <a:t>12/28/2021</a:t>
             </a:fld>
             <a:endParaRPr lang="en-US"/>
           </a:p>
@@ -11468,7 +11556,7 @@
             <a:fld id="{53074F12-AA26-4AC8-9962-C36BB8F32554}" type="datetimeFigureOut">
               <a:rPr lang="en-US" smtClean="0"/>
               <a:pPr/>
-              <a:t>12/14/2021</a:t>
+              <a:t>12/28/2021</a:t>
             </a:fld>
             <a:endParaRPr lang="en-US"/>
           </a:p>
@@ -11755,7 +11843,7 @@
             <a:fld id="{53074F12-AA26-4AC8-9962-C36BB8F32554}" type="datetimeFigureOut">
               <a:rPr lang="en-US" smtClean="0"/>
               <a:pPr/>
-              <a:t>12/14/2021</a:t>
+              <a:t>12/28/2021</a:t>
             </a:fld>
             <a:endParaRPr lang="en-US"/>
           </a:p>
@@ -12245,7 +12333,7 @@
             <a:fld id="{53074F12-AA26-4AC8-9962-C36BB8F32554}" type="datetimeFigureOut">
               <a:rPr lang="en-US" smtClean="0"/>
               <a:pPr/>
-              <a:t>12/14/2021</a:t>
+              <a:t>12/28/2021</a:t>
             </a:fld>
             <a:endParaRPr lang="en-US"/>
           </a:p>
@@ -12364,7 +12452,7 @@
             <a:fld id="{53074F12-AA26-4AC8-9962-C36BB8F32554}" type="datetimeFigureOut">
               <a:rPr lang="en-US" smtClean="0"/>
               <a:pPr/>
-              <a:t>12/14/2021</a:t>
+              <a:t>12/28/2021</a:t>
             </a:fld>
             <a:endParaRPr lang="en-US"/>
           </a:p>
@@ -12461,7 +12549,7 @@
             <a:fld id="{53074F12-AA26-4AC8-9962-C36BB8F32554}" type="datetimeFigureOut">
               <a:rPr lang="en-US" smtClean="0"/>
               <a:pPr/>
-              <a:t>12/14/2021</a:t>
+              <a:t>12/28/2021</a:t>
             </a:fld>
             <a:endParaRPr lang="en-US"/>
           </a:p>
@@ -12738,7 +12826,7 @@
             <a:fld id="{53074F12-AA26-4AC8-9962-C36BB8F32554}" type="datetimeFigureOut">
               <a:rPr lang="en-US" smtClean="0"/>
               <a:pPr/>
-              <a:t>12/14/2021</a:t>
+              <a:t>12/28/2021</a:t>
             </a:fld>
             <a:endParaRPr lang="en-US"/>
           </a:p>
@@ -12960,7 +13048,7 @@
             <a:fld id="{53074F12-AA26-4AC8-9962-C36BB8F32554}" type="datetimeFigureOut">
               <a:rPr lang="en-US" smtClean="0"/>
               <a:pPr/>
-              <a:t>12/14/2021</a:t>
+              <a:t>12/28/2021</a:t>
             </a:fld>
             <a:endParaRPr lang="en-US"/>
           </a:p>
@@ -14427,7 +14515,7 @@
           <a:p>
             <a:fld id="{43EB6DB1-3762-4EFC-B5CC-AD4013139066}" type="datetimeFigureOut">
               <a:rPr lang="en-US" smtClean="0"/>
-              <a:t>12/14/2021</a:t>
+              <a:t>12/28/2021</a:t>
             </a:fld>
             <a:endParaRPr lang="en-US"/>
           </a:p>
@@ -18728,6 +18816,376 @@
       </p:grpSpPr>
       <p:sp>
         <p:nvSpPr>
+          <p:cNvPr id="4" name="Title 3"/>
+          <p:cNvSpPr>
+            <a:spLocks noGrp="1"/>
+          </p:cNvSpPr>
+          <p:nvPr>
+            <p:ph type="title"/>
+          </p:nvPr>
+        </p:nvSpPr>
+        <p:spPr>
+          <a:xfrm>
+            <a:off x="189627" y="57150"/>
+            <a:ext cx="7016194" cy="763525"/>
+          </a:xfrm>
+        </p:spPr>
+        <p:txBody>
+          <a:bodyPr>
+            <a:normAutofit/>
+          </a:bodyPr>
+          <a:lstStyle/>
+          <a:p>
+            <a:r>
+              <a:rPr lang="en-US" dirty="0"/>
+              <a:t>Types and Structures</a:t>
+            </a:r>
+          </a:p>
+        </p:txBody>
+      </p:sp>
+      <p:pic>
+        <p:nvPicPr>
+          <p:cNvPr id="6" name="Picture 5">
+            <a:extLst>
+              <a:ext uri="{FF2B5EF4-FFF2-40B4-BE49-F238E27FC236}">
+                <a16:creationId xmlns:a16="http://schemas.microsoft.com/office/drawing/2014/main" id="{9765B5E1-D501-4FB5-903E-12C3DF9EB734}"/>
+              </a:ext>
+            </a:extLst>
+          </p:cNvPr>
+          <p:cNvPicPr>
+            <a:picLocks noChangeAspect="1"/>
+          </p:cNvPicPr>
+          <p:nvPr/>
+        </p:nvPicPr>
+        <p:blipFill>
+          <a:blip r:embed="rId3" cstate="print">
+            <a:extLst>
+              <a:ext uri="{28A0092B-C50C-407E-A947-70E740481C1C}">
+                <a14:useLocalDpi xmlns:a14="http://schemas.microsoft.com/office/drawing/2010/main"/>
+              </a:ext>
+            </a:extLst>
+          </a:blip>
+          <a:stretch>
+            <a:fillRect/>
+          </a:stretch>
+        </p:blipFill>
+        <p:spPr>
+          <a:xfrm>
+            <a:off x="7848600" y="4583336"/>
+            <a:ext cx="1028700" cy="457771"/>
+          </a:xfrm>
+          <a:prstGeom prst="rect">
+            <a:avLst/>
+          </a:prstGeom>
+        </p:spPr>
+      </p:pic>
+      <p:pic>
+        <p:nvPicPr>
+          <p:cNvPr id="10" name="Picture 9">
+            <a:extLst>
+              <a:ext uri="{FF2B5EF4-FFF2-40B4-BE49-F238E27FC236}">
+                <a16:creationId xmlns:a16="http://schemas.microsoft.com/office/drawing/2014/main" id="{876F0F2D-4C48-4CAE-AF1B-999EC10991B3}"/>
+              </a:ext>
+            </a:extLst>
+          </p:cNvPr>
+          <p:cNvPicPr>
+            <a:picLocks noChangeAspect="1"/>
+          </p:cNvPicPr>
+          <p:nvPr/>
+        </p:nvPicPr>
+        <p:blipFill>
+          <a:blip r:embed="rId4"/>
+          <a:stretch>
+            <a:fillRect/>
+          </a:stretch>
+        </p:blipFill>
+        <p:spPr>
+          <a:xfrm>
+            <a:off x="2133600" y="769881"/>
+            <a:ext cx="4973741" cy="3992619"/>
+          </a:xfrm>
+          <a:prstGeom prst="rect">
+            <a:avLst/>
+          </a:prstGeom>
+        </p:spPr>
+      </p:pic>
+      <p:sp>
+        <p:nvSpPr>
+          <p:cNvPr id="8" name="TextBox 7">
+            <a:extLst>
+              <a:ext uri="{FF2B5EF4-FFF2-40B4-BE49-F238E27FC236}">
+                <a16:creationId xmlns:a16="http://schemas.microsoft.com/office/drawing/2014/main" id="{1E887C55-1F39-4F3F-ACAD-0BD5AF129604}"/>
+              </a:ext>
+            </a:extLst>
+          </p:cNvPr>
+          <p:cNvSpPr txBox="1"/>
+          <p:nvPr/>
+        </p:nvSpPr>
+        <p:spPr>
+          <a:xfrm>
+            <a:off x="609600" y="4443412"/>
+            <a:ext cx="5181600" cy="319088"/>
+          </a:xfrm>
+          <a:prstGeom prst="rect">
+            <a:avLst/>
+          </a:prstGeom>
+          <a:solidFill>
+            <a:srgbClr val="FFFF00"/>
+          </a:solidFill>
+        </p:spPr>
+        <p:txBody>
+          <a:bodyPr vert="horz" lIns="91440" tIns="45720" rIns="91440" bIns="45720" rtlCol="0">
+            <a:normAutofit fontScale="70000" lnSpcReduction="20000"/>
+          </a:bodyPr>
+          <a:lstStyle>
+            <a:defPPr>
+              <a:defRPr lang="en-US"/>
+            </a:defPPr>
+            <a:lvl1pPr indent="0">
+              <a:spcBef>
+                <a:spcPct val="20000"/>
+              </a:spcBef>
+              <a:buFont typeface="Arial" pitchFamily="34" charset="0"/>
+              <a:buNone/>
+              <a:defRPr sz="2400"/>
+            </a:lvl1pPr>
+            <a:lvl2pPr marL="742950" indent="-285750">
+              <a:spcBef>
+                <a:spcPct val="20000"/>
+              </a:spcBef>
+              <a:buFont typeface="Arial" pitchFamily="34" charset="0"/>
+              <a:buChar char="–"/>
+              <a:defRPr sz="2800"/>
+            </a:lvl2pPr>
+            <a:lvl3pPr marL="1143000" indent="-228600">
+              <a:spcBef>
+                <a:spcPct val="20000"/>
+              </a:spcBef>
+              <a:buFont typeface="Arial" pitchFamily="34" charset="0"/>
+              <a:buChar char="•"/>
+              <a:defRPr sz="2400"/>
+            </a:lvl3pPr>
+            <a:lvl4pPr marL="1600200" indent="-228600">
+              <a:spcBef>
+                <a:spcPct val="20000"/>
+              </a:spcBef>
+              <a:buFont typeface="Arial" pitchFamily="34" charset="0"/>
+              <a:buChar char="–"/>
+              <a:defRPr sz="2000"/>
+            </a:lvl4pPr>
+            <a:lvl5pPr marL="2057400" indent="-228600">
+              <a:spcBef>
+                <a:spcPct val="20000"/>
+              </a:spcBef>
+              <a:buFont typeface="Arial" pitchFamily="34" charset="0"/>
+              <a:buChar char="»"/>
+              <a:defRPr sz="2000"/>
+            </a:lvl5pPr>
+            <a:lvl6pPr marL="2514600" indent="-228600">
+              <a:spcBef>
+                <a:spcPct val="20000"/>
+              </a:spcBef>
+              <a:buFont typeface="Arial" pitchFamily="34" charset="0"/>
+              <a:buChar char="•"/>
+              <a:defRPr sz="2000"/>
+            </a:lvl6pPr>
+            <a:lvl7pPr marL="2971800" indent="-228600">
+              <a:spcBef>
+                <a:spcPct val="20000"/>
+              </a:spcBef>
+              <a:buFont typeface="Arial" pitchFamily="34" charset="0"/>
+              <a:buChar char="•"/>
+              <a:defRPr sz="2000"/>
+            </a:lvl7pPr>
+            <a:lvl8pPr marL="3429000" indent="-228600">
+              <a:spcBef>
+                <a:spcPct val="20000"/>
+              </a:spcBef>
+              <a:buFont typeface="Arial" pitchFamily="34" charset="0"/>
+              <a:buChar char="•"/>
+              <a:defRPr sz="2000"/>
+            </a:lvl8pPr>
+            <a:lvl9pPr marL="3886200" indent="-228600">
+              <a:spcBef>
+                <a:spcPct val="20000"/>
+              </a:spcBef>
+              <a:buFont typeface="Arial" pitchFamily="34" charset="0"/>
+              <a:buChar char="•"/>
+              <a:defRPr sz="2000"/>
+            </a:lvl9pPr>
+          </a:lstStyle>
+          <a:p>
+            <a:r>
+              <a:rPr lang="en-US" dirty="0"/>
+              <a:t>Chris provided this picture emphasizing the reorganizing.</a:t>
+            </a:r>
+          </a:p>
+        </p:txBody>
+      </p:sp>
+    </p:spTree>
+    <p:extLst>
+      <p:ext uri="{BB962C8B-B14F-4D97-AF65-F5344CB8AC3E}">
+        <p14:creationId xmlns:p14="http://schemas.microsoft.com/office/powerpoint/2010/main" val="480964715"/>
+      </p:ext>
+    </p:extLst>
+  </p:cSld>
+  <p:clrMapOvr>
+    <a:masterClrMapping/>
+  </p:clrMapOvr>
+  <p:timing>
+    <p:tnLst>
+      <p:par>
+        <p:cTn id="1" dur="indefinite" restart="never" nodeType="tmRoot">
+          <p:childTnLst>
+            <p:seq concurrent="1" nextAc="seek">
+              <p:cTn id="2" dur="indefinite" nodeType="mainSeq">
+                <p:childTnLst>
+                  <p:par>
+                    <p:cTn id="3" fill="hold">
+                      <p:stCondLst>
+                        <p:cond delay="indefinite"/>
+                      </p:stCondLst>
+                      <p:childTnLst>
+                        <p:par>
+                          <p:cTn id="4" fill="hold">
+                            <p:stCondLst>
+                              <p:cond delay="0"/>
+                            </p:stCondLst>
+                            <p:childTnLst>
+                              <p:par>
+                                <p:cTn id="5" presetID="42" presetClass="entr" presetSubtype="0" fill="hold" grpId="0" nodeType="clickEffect">
+                                  <p:stCondLst>
+                                    <p:cond delay="0"/>
+                                  </p:stCondLst>
+                                  <p:childTnLst>
+                                    <p:set>
+                                      <p:cBhvr>
+                                        <p:cTn id="6" dur="1" fill="hold">
+                                          <p:stCondLst>
+                                            <p:cond delay="0"/>
+                                          </p:stCondLst>
+                                        </p:cTn>
+                                        <p:tgtEl>
+                                          <p:spTgt spid="8"/>
+                                        </p:tgtEl>
+                                        <p:attrNameLst>
+                                          <p:attrName>style.visibility</p:attrName>
+                                        </p:attrNameLst>
+                                      </p:cBhvr>
+                                      <p:to>
+                                        <p:strVal val="visible"/>
+                                      </p:to>
+                                    </p:set>
+                                    <p:animEffect transition="in" filter="fade">
+                                      <p:cBhvr>
+                                        <p:cTn id="7" dur="1000"/>
+                                        <p:tgtEl>
+                                          <p:spTgt spid="8"/>
+                                        </p:tgtEl>
+                                      </p:cBhvr>
+                                    </p:animEffect>
+                                    <p:anim calcmode="lin" valueType="num">
+                                      <p:cBhvr>
+                                        <p:cTn id="8" dur="1000" fill="hold"/>
+                                        <p:tgtEl>
+                                          <p:spTgt spid="8"/>
+                                        </p:tgtEl>
+                                        <p:attrNameLst>
+                                          <p:attrName>ppt_x</p:attrName>
+                                        </p:attrNameLst>
+                                      </p:cBhvr>
+                                      <p:tavLst>
+                                        <p:tav tm="0">
+                                          <p:val>
+                                            <p:strVal val="#ppt_x"/>
+                                          </p:val>
+                                        </p:tav>
+                                        <p:tav tm="100000">
+                                          <p:val>
+                                            <p:strVal val="#ppt_x"/>
+                                          </p:val>
+                                        </p:tav>
+                                      </p:tavLst>
+                                    </p:anim>
+                                    <p:anim calcmode="lin" valueType="num">
+                                      <p:cBhvr>
+                                        <p:cTn id="9" dur="1000" fill="hold"/>
+                                        <p:tgtEl>
+                                          <p:spTgt spid="8"/>
+                                        </p:tgtEl>
+                                        <p:attrNameLst>
+                                          <p:attrName>ppt_y</p:attrName>
+                                        </p:attrNameLst>
+                                      </p:cBhvr>
+                                      <p:tavLst>
+                                        <p:tav tm="0">
+                                          <p:val>
+                                            <p:strVal val="#ppt_y+.1"/>
+                                          </p:val>
+                                        </p:tav>
+                                        <p:tav tm="100000">
+                                          <p:val>
+                                            <p:strVal val="#ppt_y"/>
+                                          </p:val>
+                                        </p:tav>
+                                      </p:tavLst>
+                                    </p:anim>
+                                  </p:childTnLst>
+                                </p:cTn>
+                              </p:par>
+                            </p:childTnLst>
+                          </p:cTn>
+                        </p:par>
+                      </p:childTnLst>
+                    </p:cTn>
+                  </p:par>
+                </p:childTnLst>
+              </p:cTn>
+              <p:prevCondLst>
+                <p:cond evt="onPrev" delay="0">
+                  <p:tgtEl>
+                    <p:sldTgt/>
+                  </p:tgtEl>
+                </p:cond>
+              </p:prevCondLst>
+              <p:nextCondLst>
+                <p:cond evt="onNext" delay="0">
+                  <p:tgtEl>
+                    <p:sldTgt/>
+                  </p:tgtEl>
+                </p:cond>
+              </p:nextCondLst>
+            </p:seq>
+          </p:childTnLst>
+        </p:cTn>
+      </p:par>
+    </p:tnLst>
+    <p:bldLst>
+      <p:bldP spid="8" grpId="0"/>
+    </p:bldLst>
+  </p:timing>
+</p:sld>
+</file>
+
+<file path=ppt/slides/slide15.xml><?xml version="1.0" encoding="utf-8"?>
+<p:sld xmlns:a="http://schemas.openxmlformats.org/drawingml/2006/main" xmlns:r="http://schemas.openxmlformats.org/officeDocument/2006/relationships" xmlns:p="http://schemas.openxmlformats.org/presentationml/2006/main">
+  <p:cSld>
+    <p:spTree>
+      <p:nvGrpSpPr>
+        <p:cNvPr id="1" name=""/>
+        <p:cNvGrpSpPr/>
+        <p:nvPr/>
+      </p:nvGrpSpPr>
+      <p:grpSpPr>
+        <a:xfrm>
+          <a:off x="0" y="0"/>
+          <a:ext cx="0" cy="0"/>
+          <a:chOff x="0" y="0"/>
+          <a:chExt cx="0" cy="0"/>
+        </a:xfrm>
+      </p:grpSpPr>
+      <p:sp>
+        <p:nvSpPr>
           <p:cNvPr id="4" name="Title 3">
             <a:extLst>
               <a:ext uri="{FF2B5EF4-FFF2-40B4-BE49-F238E27FC236}">
@@ -18895,7 +19353,7 @@
 </p:sld>
 </file>
 
-<file path=ppt/slides/slide15.xml><?xml version="1.0" encoding="utf-8"?>
+<file path=ppt/slides/slide16.xml><?xml version="1.0" encoding="utf-8"?>
 <p:sld xmlns:a="http://schemas.openxmlformats.org/drawingml/2006/main" xmlns:r="http://schemas.openxmlformats.org/officeDocument/2006/relationships" xmlns:p="http://schemas.openxmlformats.org/presentationml/2006/main">
   <p:cSld>
     <p:spTree>
@@ -19588,7 +20046,7 @@
 </p:sld>
 </file>
 
-<file path=ppt/slides/slide16.xml><?xml version="1.0" encoding="utf-8"?>
+<file path=ppt/slides/slide17.xml><?xml version="1.0" encoding="utf-8"?>
 <p:sld xmlns:a="http://schemas.openxmlformats.org/drawingml/2006/main" xmlns:r="http://schemas.openxmlformats.org/officeDocument/2006/relationships" xmlns:p="http://schemas.openxmlformats.org/presentationml/2006/main">
   <p:cSld>
     <p:spTree>
@@ -21127,7 +21585,7 @@
 </p:sld>
 </file>
 
-<file path=ppt/slides/slide17.xml><?xml version="1.0" encoding="utf-8"?>
+<file path=ppt/slides/slide18.xml><?xml version="1.0" encoding="utf-8"?>
 <p:sld xmlns:a="http://schemas.openxmlformats.org/drawingml/2006/main" xmlns:r="http://schemas.openxmlformats.org/officeDocument/2006/relationships" xmlns:p="http://schemas.openxmlformats.org/presentationml/2006/main">
   <p:cSld>
     <p:spTree>
@@ -22817,7 +23275,7 @@
 </p:sld>
 </file>
 
-<file path=ppt/slides/slide18.xml><?xml version="1.0" encoding="utf-8"?>
+<file path=ppt/slides/slide19.xml><?xml version="1.0" encoding="utf-8"?>
 <p:sld xmlns:a="http://schemas.openxmlformats.org/drawingml/2006/main" xmlns:r="http://schemas.openxmlformats.org/officeDocument/2006/relationships" xmlns:p="http://schemas.openxmlformats.org/presentationml/2006/main">
   <p:cSld>
     <p:spTree>
@@ -23688,181 +24146,6 @@
       </p:par>
     </p:tnLst>
   </p:timing>
-</p:sld>
-</file>
-
-<file path=ppt/slides/slide19.xml><?xml version="1.0" encoding="utf-8"?>
-<p:sld xmlns:a="http://schemas.openxmlformats.org/drawingml/2006/main" xmlns:r="http://schemas.openxmlformats.org/officeDocument/2006/relationships" xmlns:p="http://schemas.openxmlformats.org/presentationml/2006/main">
-  <p:cSld>
-    <p:spTree>
-      <p:nvGrpSpPr>
-        <p:cNvPr id="1" name=""/>
-        <p:cNvGrpSpPr/>
-        <p:nvPr/>
-      </p:nvGrpSpPr>
-      <p:grpSpPr>
-        <a:xfrm>
-          <a:off x="0" y="0"/>
-          <a:ext cx="0" cy="0"/>
-          <a:chOff x="0" y="0"/>
-          <a:chExt cx="0" cy="0"/>
-        </a:xfrm>
-      </p:grpSpPr>
-      <p:sp>
-        <p:nvSpPr>
-          <p:cNvPr id="4" name="Title 3">
-            <a:extLst>
-              <a:ext uri="{FF2B5EF4-FFF2-40B4-BE49-F238E27FC236}">
-                <a16:creationId xmlns:a16="http://schemas.microsoft.com/office/drawing/2014/main" id="{BDE6CE25-34FB-4714-9DAA-1CEAE47154BE}"/>
-              </a:ext>
-            </a:extLst>
-          </p:cNvPr>
-          <p:cNvSpPr>
-            <a:spLocks noGrp="1"/>
-          </p:cNvSpPr>
-          <p:nvPr>
-            <p:ph type="title"/>
-          </p:nvPr>
-        </p:nvSpPr>
-        <p:spPr>
-          <a:xfrm>
-            <a:off x="659756" y="2416323"/>
-            <a:ext cx="8345486" cy="1021556"/>
-          </a:xfrm>
-        </p:spPr>
-        <p:txBody>
-          <a:bodyPr>
-            <a:normAutofit fontScale="90000"/>
-          </a:bodyPr>
-          <a:lstStyle/>
-          <a:p>
-            <a:r>
-              <a:rPr lang="en-US" dirty="0"/>
-              <a:t>Sample Code Fragments</a:t>
-            </a:r>
-            <a:br>
-              <a:rPr lang="en-US" dirty="0"/>
-            </a:br>
-            <a:endParaRPr lang="en-US" dirty="0"/>
-          </a:p>
-        </p:txBody>
-      </p:sp>
-      <p:sp>
-        <p:nvSpPr>
-          <p:cNvPr id="5" name="Text Placeholder 4">
-            <a:extLst>
-              <a:ext uri="{FF2B5EF4-FFF2-40B4-BE49-F238E27FC236}">
-                <a16:creationId xmlns:a16="http://schemas.microsoft.com/office/drawing/2014/main" id="{E0AB60C3-939D-43D0-812C-6CEDD6D880B3}"/>
-              </a:ext>
-            </a:extLst>
-          </p:cNvPr>
-          <p:cNvSpPr>
-            <a:spLocks noGrp="1"/>
-          </p:cNvSpPr>
-          <p:nvPr>
-            <p:ph type="body" idx="1"/>
-          </p:nvPr>
-        </p:nvSpPr>
-        <p:spPr>
-          <a:xfrm>
-            <a:off x="685800" y="1276350"/>
-            <a:ext cx="7772400" cy="1125140"/>
-          </a:xfrm>
-        </p:spPr>
-        <p:txBody>
-          <a:bodyPr/>
-          <a:lstStyle/>
-          <a:p>
-            <a:r>
-              <a:rPr lang="en-US" dirty="0"/>
-              <a:t>Part 4</a:t>
-            </a:r>
-          </a:p>
-        </p:txBody>
-      </p:sp>
-      <p:sp>
-        <p:nvSpPr>
-          <p:cNvPr id="6" name="Flowchart: Terminator 5">
-            <a:extLst>
-              <a:ext uri="{FF2B5EF4-FFF2-40B4-BE49-F238E27FC236}">
-                <a16:creationId xmlns:a16="http://schemas.microsoft.com/office/drawing/2014/main" id="{161E8961-2C6D-458F-B0DC-AAD89C6AC85A}"/>
-              </a:ext>
-            </a:extLst>
-          </p:cNvPr>
-          <p:cNvSpPr/>
-          <p:nvPr/>
-        </p:nvSpPr>
-        <p:spPr>
-          <a:xfrm>
-            <a:off x="7467600" y="4552950"/>
-            <a:ext cx="1103376" cy="228600"/>
-          </a:xfrm>
-          <a:prstGeom prst="flowChartTerminator">
-            <a:avLst/>
-          </a:prstGeom>
-          <a:solidFill>
-            <a:schemeClr val="accent3">
-              <a:lumMod val="20000"/>
-              <a:lumOff val="80000"/>
-            </a:schemeClr>
-          </a:solidFill>
-          <a:ln>
-            <a:solidFill>
-              <a:schemeClr val="accent3">
-                <a:lumMod val="60000"/>
-                <a:lumOff val="40000"/>
-              </a:schemeClr>
-            </a:solidFill>
-          </a:ln>
-        </p:spPr>
-        <p:style>
-          <a:lnRef idx="2">
-            <a:schemeClr val="accent1">
-              <a:shade val="50000"/>
-            </a:schemeClr>
-          </a:lnRef>
-          <a:fillRef idx="1">
-            <a:schemeClr val="accent1"/>
-          </a:fillRef>
-          <a:effectRef idx="0">
-            <a:schemeClr val="accent1"/>
-          </a:effectRef>
-          <a:fontRef idx="minor">
-            <a:schemeClr val="lt1"/>
-          </a:fontRef>
-        </p:style>
-        <p:txBody>
-          <a:bodyPr rtlCol="0" anchor="ctr"/>
-          <a:lstStyle/>
-          <a:p>
-            <a:pPr algn="ctr"/>
-            <a:r>
-              <a:rPr lang="en-US" sz="1000" dirty="0">
-                <a:solidFill>
-                  <a:schemeClr val="tx1"/>
-                </a:solidFill>
-                <a:hlinkClick r:id="rId3" action="ppaction://hlinksldjump"/>
-              </a:rPr>
-              <a:t>Back to Agenda</a:t>
-            </a:r>
-            <a:endParaRPr lang="en-US" sz="1000" dirty="0">
-              <a:solidFill>
-                <a:schemeClr val="tx1"/>
-              </a:solidFill>
-            </a:endParaRPr>
-          </a:p>
-        </p:txBody>
-      </p:sp>
-    </p:spTree>
-    <p:extLst>
-      <p:ext uri="{BB962C8B-B14F-4D97-AF65-F5344CB8AC3E}">
-        <p14:creationId xmlns:p14="http://schemas.microsoft.com/office/powerpoint/2010/main" val="1393776198"/>
-      </p:ext>
-    </p:extLst>
-  </p:cSld>
-  <p:clrMapOvr>
-    <a:masterClrMapping/>
-  </p:clrMapOvr>
 </p:sld>
 </file>
 
@@ -24763,6 +25046,181 @@
 </file>
 
 <file path=ppt/slides/slide20.xml><?xml version="1.0" encoding="utf-8"?>
+<p:sld xmlns:a="http://schemas.openxmlformats.org/drawingml/2006/main" xmlns:r="http://schemas.openxmlformats.org/officeDocument/2006/relationships" xmlns:p="http://schemas.openxmlformats.org/presentationml/2006/main">
+  <p:cSld>
+    <p:spTree>
+      <p:nvGrpSpPr>
+        <p:cNvPr id="1" name=""/>
+        <p:cNvGrpSpPr/>
+        <p:nvPr/>
+      </p:nvGrpSpPr>
+      <p:grpSpPr>
+        <a:xfrm>
+          <a:off x="0" y="0"/>
+          <a:ext cx="0" cy="0"/>
+          <a:chOff x="0" y="0"/>
+          <a:chExt cx="0" cy="0"/>
+        </a:xfrm>
+      </p:grpSpPr>
+      <p:sp>
+        <p:nvSpPr>
+          <p:cNvPr id="4" name="Title 3">
+            <a:extLst>
+              <a:ext uri="{FF2B5EF4-FFF2-40B4-BE49-F238E27FC236}">
+                <a16:creationId xmlns:a16="http://schemas.microsoft.com/office/drawing/2014/main" id="{BDE6CE25-34FB-4714-9DAA-1CEAE47154BE}"/>
+              </a:ext>
+            </a:extLst>
+          </p:cNvPr>
+          <p:cNvSpPr>
+            <a:spLocks noGrp="1"/>
+          </p:cNvSpPr>
+          <p:nvPr>
+            <p:ph type="title"/>
+          </p:nvPr>
+        </p:nvSpPr>
+        <p:spPr>
+          <a:xfrm>
+            <a:off x="659756" y="2416323"/>
+            <a:ext cx="8345486" cy="1021556"/>
+          </a:xfrm>
+        </p:spPr>
+        <p:txBody>
+          <a:bodyPr>
+            <a:normAutofit fontScale="90000"/>
+          </a:bodyPr>
+          <a:lstStyle/>
+          <a:p>
+            <a:r>
+              <a:rPr lang="en-US" dirty="0"/>
+              <a:t>Sample Code Fragments</a:t>
+            </a:r>
+            <a:br>
+              <a:rPr lang="en-US" dirty="0"/>
+            </a:br>
+            <a:endParaRPr lang="en-US" dirty="0"/>
+          </a:p>
+        </p:txBody>
+      </p:sp>
+      <p:sp>
+        <p:nvSpPr>
+          <p:cNvPr id="5" name="Text Placeholder 4">
+            <a:extLst>
+              <a:ext uri="{FF2B5EF4-FFF2-40B4-BE49-F238E27FC236}">
+                <a16:creationId xmlns:a16="http://schemas.microsoft.com/office/drawing/2014/main" id="{E0AB60C3-939D-43D0-812C-6CEDD6D880B3}"/>
+              </a:ext>
+            </a:extLst>
+          </p:cNvPr>
+          <p:cNvSpPr>
+            <a:spLocks noGrp="1"/>
+          </p:cNvSpPr>
+          <p:nvPr>
+            <p:ph type="body" idx="1"/>
+          </p:nvPr>
+        </p:nvSpPr>
+        <p:spPr>
+          <a:xfrm>
+            <a:off x="685800" y="1276350"/>
+            <a:ext cx="7772400" cy="1125140"/>
+          </a:xfrm>
+        </p:spPr>
+        <p:txBody>
+          <a:bodyPr/>
+          <a:lstStyle/>
+          <a:p>
+            <a:r>
+              <a:rPr lang="en-US" dirty="0"/>
+              <a:t>Part 4</a:t>
+            </a:r>
+          </a:p>
+        </p:txBody>
+      </p:sp>
+      <p:sp>
+        <p:nvSpPr>
+          <p:cNvPr id="6" name="Flowchart: Terminator 5">
+            <a:extLst>
+              <a:ext uri="{FF2B5EF4-FFF2-40B4-BE49-F238E27FC236}">
+                <a16:creationId xmlns:a16="http://schemas.microsoft.com/office/drawing/2014/main" id="{161E8961-2C6D-458F-B0DC-AAD89C6AC85A}"/>
+              </a:ext>
+            </a:extLst>
+          </p:cNvPr>
+          <p:cNvSpPr/>
+          <p:nvPr/>
+        </p:nvSpPr>
+        <p:spPr>
+          <a:xfrm>
+            <a:off x="7467600" y="4552950"/>
+            <a:ext cx="1103376" cy="228600"/>
+          </a:xfrm>
+          <a:prstGeom prst="flowChartTerminator">
+            <a:avLst/>
+          </a:prstGeom>
+          <a:solidFill>
+            <a:schemeClr val="accent3">
+              <a:lumMod val="20000"/>
+              <a:lumOff val="80000"/>
+            </a:schemeClr>
+          </a:solidFill>
+          <a:ln>
+            <a:solidFill>
+              <a:schemeClr val="accent3">
+                <a:lumMod val="60000"/>
+                <a:lumOff val="40000"/>
+              </a:schemeClr>
+            </a:solidFill>
+          </a:ln>
+        </p:spPr>
+        <p:style>
+          <a:lnRef idx="2">
+            <a:schemeClr val="accent1">
+              <a:shade val="50000"/>
+            </a:schemeClr>
+          </a:lnRef>
+          <a:fillRef idx="1">
+            <a:schemeClr val="accent1"/>
+          </a:fillRef>
+          <a:effectRef idx="0">
+            <a:schemeClr val="accent1"/>
+          </a:effectRef>
+          <a:fontRef idx="minor">
+            <a:schemeClr val="lt1"/>
+          </a:fontRef>
+        </p:style>
+        <p:txBody>
+          <a:bodyPr rtlCol="0" anchor="ctr"/>
+          <a:lstStyle/>
+          <a:p>
+            <a:pPr algn="ctr"/>
+            <a:r>
+              <a:rPr lang="en-US" sz="1000" dirty="0">
+                <a:solidFill>
+                  <a:schemeClr val="tx1"/>
+                </a:solidFill>
+                <a:hlinkClick r:id="rId3" action="ppaction://hlinksldjump"/>
+              </a:rPr>
+              <a:t>Back to Agenda</a:t>
+            </a:r>
+            <a:endParaRPr lang="en-US" sz="1000" dirty="0">
+              <a:solidFill>
+                <a:schemeClr val="tx1"/>
+              </a:solidFill>
+            </a:endParaRPr>
+          </a:p>
+        </p:txBody>
+      </p:sp>
+    </p:spTree>
+    <p:extLst>
+      <p:ext uri="{BB962C8B-B14F-4D97-AF65-F5344CB8AC3E}">
+        <p14:creationId xmlns:p14="http://schemas.microsoft.com/office/powerpoint/2010/main" val="1393776198"/>
+      </p:ext>
+    </p:extLst>
+  </p:cSld>
+  <p:clrMapOvr>
+    <a:masterClrMapping/>
+  </p:clrMapOvr>
+</p:sld>
+</file>
+
+<file path=ppt/slides/slide21.xml><?xml version="1.0" encoding="utf-8"?>
 <p:sld xmlns:a="http://schemas.openxmlformats.org/drawingml/2006/main" xmlns:r="http://schemas.openxmlformats.org/officeDocument/2006/relationships" xmlns:p="http://schemas.openxmlformats.org/presentationml/2006/main">
   <p:cSld>
     <p:spTree>
@@ -25834,7 +26292,7 @@
 </p:sld>
 </file>
 
-<file path=ppt/slides/slide21.xml><?xml version="1.0" encoding="utf-8"?>
+<file path=ppt/slides/slide22.xml><?xml version="1.0" encoding="utf-8"?>
 <p:sld xmlns:a="http://schemas.openxmlformats.org/drawingml/2006/main" xmlns:r="http://schemas.openxmlformats.org/officeDocument/2006/relationships" xmlns:p="http://schemas.openxmlformats.org/presentationml/2006/main">
   <p:cSld>
     <p:spTree>
@@ -26428,7 +26886,7 @@
 </p:sld>
 </file>
 
-<file path=ppt/slides/slide22.xml><?xml version="1.0" encoding="utf-8"?>
+<file path=ppt/slides/slide23.xml><?xml version="1.0" encoding="utf-8"?>
 <p:sld xmlns:a="http://schemas.openxmlformats.org/drawingml/2006/main" xmlns:r="http://schemas.openxmlformats.org/officeDocument/2006/relationships" xmlns:p="http://schemas.openxmlformats.org/presentationml/2006/main">
   <p:cSld>
     <p:spTree>
@@ -26916,7 +27374,7 @@
 </p:sld>
 </file>
 
-<file path=ppt/slides/slide23.xml><?xml version="1.0" encoding="utf-8"?>
+<file path=ppt/slides/slide24.xml><?xml version="1.0" encoding="utf-8"?>
 <p:sld xmlns:a="http://schemas.openxmlformats.org/drawingml/2006/main" xmlns:r="http://schemas.openxmlformats.org/officeDocument/2006/relationships" xmlns:p="http://schemas.openxmlformats.org/presentationml/2006/main">
   <p:cSld>
     <p:spTree>
@@ -27557,7 +28015,7 @@
 </p:sld>
 </file>
 
-<file path=ppt/slides/slide24.xml><?xml version="1.0" encoding="utf-8"?>
+<file path=ppt/slides/slide25.xml><?xml version="1.0" encoding="utf-8"?>
 <p:sld xmlns:a="http://schemas.openxmlformats.org/drawingml/2006/main" xmlns:r="http://schemas.openxmlformats.org/officeDocument/2006/relationships" xmlns:p="http://schemas.openxmlformats.org/presentationml/2006/main">
   <p:cSld>
     <p:spTree>
@@ -29033,7 +29491,7 @@
 </p:sld>
 </file>
 
-<file path=ppt/slides/slide25.xml><?xml version="1.0" encoding="utf-8"?>
+<file path=ppt/slides/slide26.xml><?xml version="1.0" encoding="utf-8"?>
 <p:sld xmlns:a="http://schemas.openxmlformats.org/drawingml/2006/main" xmlns:r="http://schemas.openxmlformats.org/officeDocument/2006/relationships" xmlns:p="http://schemas.openxmlformats.org/presentationml/2006/main">
   <p:cSld>
     <p:spTree>
@@ -29523,7 +29981,7 @@
 </p:sld>
 </file>
 
-<file path=ppt/slides/slide26.xml><?xml version="1.0" encoding="utf-8"?>
+<file path=ppt/slides/slide27.xml><?xml version="1.0" encoding="utf-8"?>
 <p:sld xmlns:a="http://schemas.openxmlformats.org/drawingml/2006/main" xmlns:r="http://schemas.openxmlformats.org/officeDocument/2006/relationships" xmlns:p="http://schemas.openxmlformats.org/presentationml/2006/main">
   <p:cSld>
     <p:spTree>
@@ -29694,7 +30152,7 @@
 </p:sld>
 </file>
 
-<file path=ppt/slides/slide27.xml><?xml version="1.0" encoding="utf-8"?>
+<file path=ppt/slides/slide28.xml><?xml version="1.0" encoding="utf-8"?>
 <p:sld xmlns:a="http://schemas.openxmlformats.org/drawingml/2006/main" xmlns:r="http://schemas.openxmlformats.org/officeDocument/2006/relationships" xmlns:p="http://schemas.openxmlformats.org/presentationml/2006/main">
   <p:cSld>
     <p:spTree>
@@ -30460,7 +30918,7 @@
 </p:sld>
 </file>
 
-<file path=ppt/slides/slide28.xml><?xml version="1.0" encoding="utf-8"?>
+<file path=ppt/slides/slide29.xml><?xml version="1.0" encoding="utf-8"?>
 <p:sld xmlns:a="http://schemas.openxmlformats.org/drawingml/2006/main" xmlns:r="http://schemas.openxmlformats.org/officeDocument/2006/relationships" xmlns:p="http://schemas.openxmlformats.org/presentationml/2006/main">
   <p:cSld>
     <p:spTree>
@@ -31208,7 +31666,133 @@
 </p:sld>
 </file>
 
-<file path=ppt/slides/slide29.xml><?xml version="1.0" encoding="utf-8"?>
+<file path=ppt/slides/slide3.xml><?xml version="1.0" encoding="utf-8"?>
+<p:sld xmlns:a="http://schemas.openxmlformats.org/drawingml/2006/main" xmlns:r="http://schemas.openxmlformats.org/officeDocument/2006/relationships" xmlns:p="http://schemas.openxmlformats.org/presentationml/2006/main">
+  <p:cSld>
+    <p:spTree>
+      <p:nvGrpSpPr>
+        <p:cNvPr id="1" name=""/>
+        <p:cNvGrpSpPr/>
+        <p:nvPr/>
+      </p:nvGrpSpPr>
+      <p:grpSpPr>
+        <a:xfrm>
+          <a:off x="0" y="0"/>
+          <a:ext cx="0" cy="0"/>
+          <a:chOff x="0" y="0"/>
+          <a:chExt cx="0" cy="0"/>
+        </a:xfrm>
+      </p:grpSpPr>
+      <p:sp>
+        <p:nvSpPr>
+          <p:cNvPr id="2" name="Title 1"/>
+          <p:cNvSpPr>
+            <a:spLocks noGrp="1"/>
+          </p:cNvSpPr>
+          <p:nvPr>
+            <p:ph type="title"/>
+          </p:nvPr>
+        </p:nvSpPr>
+        <p:spPr/>
+        <p:txBody>
+          <a:bodyPr>
+            <a:normAutofit/>
+          </a:bodyPr>
+          <a:lstStyle/>
+          <a:p>
+            <a:r>
+              <a:rPr lang="en-US" dirty="0"/>
+              <a:t>Introduction</a:t>
+            </a:r>
+          </a:p>
+        </p:txBody>
+      </p:sp>
+      <p:pic>
+        <p:nvPicPr>
+          <p:cNvPr id="4" name="Picture 3">
+            <a:extLst>
+              <a:ext uri="{FF2B5EF4-FFF2-40B4-BE49-F238E27FC236}">
+                <a16:creationId xmlns:a16="http://schemas.microsoft.com/office/drawing/2014/main" id="{8CBCA567-7F2C-4256-9D8B-A87EC4D25AAB}"/>
+              </a:ext>
+            </a:extLst>
+          </p:cNvPr>
+          <p:cNvPicPr>
+            <a:picLocks noChangeAspect="1"/>
+          </p:cNvPicPr>
+          <p:nvPr/>
+        </p:nvPicPr>
+        <p:blipFill>
+          <a:blip r:embed="rId3" cstate="print">
+            <a:extLst>
+              <a:ext uri="{28A0092B-C50C-407E-A947-70E740481C1C}">
+                <a14:useLocalDpi xmlns:a14="http://schemas.microsoft.com/office/drawing/2010/main"/>
+              </a:ext>
+            </a:extLst>
+          </a:blip>
+          <a:stretch>
+            <a:fillRect/>
+          </a:stretch>
+        </p:blipFill>
+        <p:spPr>
+          <a:xfrm>
+            <a:off x="7848600" y="4583336"/>
+            <a:ext cx="1028700" cy="457771"/>
+          </a:xfrm>
+          <a:prstGeom prst="rect">
+            <a:avLst/>
+          </a:prstGeom>
+        </p:spPr>
+      </p:pic>
+      <p:pic>
+        <p:nvPicPr>
+          <p:cNvPr id="6" name="Picture 5">
+            <a:extLst>
+              <a:ext uri="{FF2B5EF4-FFF2-40B4-BE49-F238E27FC236}">
+                <a16:creationId xmlns:a16="http://schemas.microsoft.com/office/drawing/2014/main" id="{2FA1156E-8DE9-4005-9DDD-96F1A1DB3865}"/>
+              </a:ext>
+            </a:extLst>
+          </p:cNvPr>
+          <p:cNvPicPr>
+            <a:picLocks noChangeAspect="1"/>
+          </p:cNvPicPr>
+          <p:nvPr/>
+        </p:nvPicPr>
+        <p:blipFill>
+          <a:blip r:embed="rId4" cstate="print">
+            <a:extLst>
+              <a:ext uri="{28A0092B-C50C-407E-A947-70E740481C1C}">
+                <a14:useLocalDpi xmlns:a14="http://schemas.microsoft.com/office/drawing/2010/main"/>
+              </a:ext>
+            </a:extLst>
+          </a:blip>
+          <a:stretch>
+            <a:fillRect/>
+          </a:stretch>
+        </p:blipFill>
+        <p:spPr>
+          <a:xfrm>
+            <a:off x="1447800" y="1200150"/>
+            <a:ext cx="5486400" cy="3624744"/>
+          </a:xfrm>
+          <a:prstGeom prst="rect">
+            <a:avLst/>
+          </a:prstGeom>
+        </p:spPr>
+      </p:pic>
+    </p:spTree>
+    <p:extLst>
+      <p:ext uri="{BB962C8B-B14F-4D97-AF65-F5344CB8AC3E}">
+        <p14:creationId xmlns:p14="http://schemas.microsoft.com/office/powerpoint/2010/main" val="3799763821"/>
+      </p:ext>
+    </p:extLst>
+  </p:cSld>
+  <p:clrMapOvr>
+    <a:masterClrMapping/>
+  </p:clrMapOvr>
+</p:sld>
+</file>
+
+<file path=ppt/slides/slide30.xml><?xml version="1.0" encoding="utf-8"?>
 <p:sld xmlns:a="http://schemas.openxmlformats.org/drawingml/2006/main" xmlns:r="http://schemas.openxmlformats.org/officeDocument/2006/relationships" xmlns:p="http://schemas.openxmlformats.org/presentationml/2006/main">
   <p:cSld>
     <p:spTree>
@@ -31906,133 +32490,7 @@
 </p:sld>
 </file>
 
-<file path=ppt/slides/slide3.xml><?xml version="1.0" encoding="utf-8"?>
-<p:sld xmlns:a="http://schemas.openxmlformats.org/drawingml/2006/main" xmlns:r="http://schemas.openxmlformats.org/officeDocument/2006/relationships" xmlns:p="http://schemas.openxmlformats.org/presentationml/2006/main">
-  <p:cSld>
-    <p:spTree>
-      <p:nvGrpSpPr>
-        <p:cNvPr id="1" name=""/>
-        <p:cNvGrpSpPr/>
-        <p:nvPr/>
-      </p:nvGrpSpPr>
-      <p:grpSpPr>
-        <a:xfrm>
-          <a:off x="0" y="0"/>
-          <a:ext cx="0" cy="0"/>
-          <a:chOff x="0" y="0"/>
-          <a:chExt cx="0" cy="0"/>
-        </a:xfrm>
-      </p:grpSpPr>
-      <p:sp>
-        <p:nvSpPr>
-          <p:cNvPr id="2" name="Title 1"/>
-          <p:cNvSpPr>
-            <a:spLocks noGrp="1"/>
-          </p:cNvSpPr>
-          <p:nvPr>
-            <p:ph type="title"/>
-          </p:nvPr>
-        </p:nvSpPr>
-        <p:spPr/>
-        <p:txBody>
-          <a:bodyPr>
-            <a:normAutofit/>
-          </a:bodyPr>
-          <a:lstStyle/>
-          <a:p>
-            <a:r>
-              <a:rPr lang="en-US" dirty="0"/>
-              <a:t>Introduction</a:t>
-            </a:r>
-          </a:p>
-        </p:txBody>
-      </p:sp>
-      <p:pic>
-        <p:nvPicPr>
-          <p:cNvPr id="4" name="Picture 3">
-            <a:extLst>
-              <a:ext uri="{FF2B5EF4-FFF2-40B4-BE49-F238E27FC236}">
-                <a16:creationId xmlns:a16="http://schemas.microsoft.com/office/drawing/2014/main" id="{8CBCA567-7F2C-4256-9D8B-A87EC4D25AAB}"/>
-              </a:ext>
-            </a:extLst>
-          </p:cNvPr>
-          <p:cNvPicPr>
-            <a:picLocks noChangeAspect="1"/>
-          </p:cNvPicPr>
-          <p:nvPr/>
-        </p:nvPicPr>
-        <p:blipFill>
-          <a:blip r:embed="rId3" cstate="print">
-            <a:extLst>
-              <a:ext uri="{28A0092B-C50C-407E-A947-70E740481C1C}">
-                <a14:useLocalDpi xmlns:a14="http://schemas.microsoft.com/office/drawing/2010/main"/>
-              </a:ext>
-            </a:extLst>
-          </a:blip>
-          <a:stretch>
-            <a:fillRect/>
-          </a:stretch>
-        </p:blipFill>
-        <p:spPr>
-          <a:xfrm>
-            <a:off x="7848600" y="4583336"/>
-            <a:ext cx="1028700" cy="457771"/>
-          </a:xfrm>
-          <a:prstGeom prst="rect">
-            <a:avLst/>
-          </a:prstGeom>
-        </p:spPr>
-      </p:pic>
-      <p:pic>
-        <p:nvPicPr>
-          <p:cNvPr id="6" name="Picture 5">
-            <a:extLst>
-              <a:ext uri="{FF2B5EF4-FFF2-40B4-BE49-F238E27FC236}">
-                <a16:creationId xmlns:a16="http://schemas.microsoft.com/office/drawing/2014/main" id="{2FA1156E-8DE9-4005-9DDD-96F1A1DB3865}"/>
-              </a:ext>
-            </a:extLst>
-          </p:cNvPr>
-          <p:cNvPicPr>
-            <a:picLocks noChangeAspect="1"/>
-          </p:cNvPicPr>
-          <p:nvPr/>
-        </p:nvPicPr>
-        <p:blipFill>
-          <a:blip r:embed="rId4" cstate="print">
-            <a:extLst>
-              <a:ext uri="{28A0092B-C50C-407E-A947-70E740481C1C}">
-                <a14:useLocalDpi xmlns:a14="http://schemas.microsoft.com/office/drawing/2010/main"/>
-              </a:ext>
-            </a:extLst>
-          </a:blip>
-          <a:stretch>
-            <a:fillRect/>
-          </a:stretch>
-        </p:blipFill>
-        <p:spPr>
-          <a:xfrm>
-            <a:off x="1447800" y="1200150"/>
-            <a:ext cx="5486400" cy="3624744"/>
-          </a:xfrm>
-          <a:prstGeom prst="rect">
-            <a:avLst/>
-          </a:prstGeom>
-        </p:spPr>
-      </p:pic>
-    </p:spTree>
-    <p:extLst>
-      <p:ext uri="{BB962C8B-B14F-4D97-AF65-F5344CB8AC3E}">
-        <p14:creationId xmlns:p14="http://schemas.microsoft.com/office/powerpoint/2010/main" val="3799763821"/>
-      </p:ext>
-    </p:extLst>
-  </p:cSld>
-  <p:clrMapOvr>
-    <a:masterClrMapping/>
-  </p:clrMapOvr>
-</p:sld>
-</file>
-
-<file path=ppt/slides/slide30.xml><?xml version="1.0" encoding="utf-8"?>
+<file path=ppt/slides/slide31.xml><?xml version="1.0" encoding="utf-8"?>
 <p:sld xmlns:a="http://schemas.openxmlformats.org/drawingml/2006/main" xmlns:r="http://schemas.openxmlformats.org/officeDocument/2006/relationships" xmlns:p="http://schemas.openxmlformats.org/presentationml/2006/main">
   <p:cSld>
     <p:spTree>
@@ -32753,7 +33211,7 @@
 </p:sld>
 </file>
 
-<file path=ppt/slides/slide31.xml><?xml version="1.0" encoding="utf-8"?>
+<file path=ppt/slides/slide32.xml><?xml version="1.0" encoding="utf-8"?>
 <p:sld xmlns:a="http://schemas.openxmlformats.org/drawingml/2006/main" xmlns:r="http://schemas.openxmlformats.org/officeDocument/2006/relationships" xmlns:p="http://schemas.openxmlformats.org/presentationml/2006/main">
   <p:cSld>
     <p:spTree>
@@ -33531,7 +33989,7 @@
 </p:sld>
 </file>
 
-<file path=ppt/slides/slide32.xml><?xml version="1.0" encoding="utf-8"?>
+<file path=ppt/slides/slide33.xml><?xml version="1.0" encoding="utf-8"?>
 <p:sld xmlns:a="http://schemas.openxmlformats.org/drawingml/2006/main" xmlns:r="http://schemas.openxmlformats.org/officeDocument/2006/relationships" xmlns:p="http://schemas.openxmlformats.org/presentationml/2006/main">
   <p:cSld>
     <p:spTree>
@@ -33749,7 +34207,7 @@
 </p:sld>
 </file>
 
-<file path=ppt/slides/slide33.xml><?xml version="1.0" encoding="utf-8"?>
+<file path=ppt/slides/slide34.xml><?xml version="1.0" encoding="utf-8"?>
 <p:sld xmlns:a="http://schemas.openxmlformats.org/drawingml/2006/main" xmlns:r="http://schemas.openxmlformats.org/officeDocument/2006/relationships" xmlns:p="http://schemas.openxmlformats.org/presentationml/2006/main">
   <p:cSld>
     <p:spTree>
@@ -33854,7 +34312,7 @@
 </p:sld>
 </file>
 
-<file path=ppt/slides/slide34.xml><?xml version="1.0" encoding="utf-8"?>
+<file path=ppt/slides/slide35.xml><?xml version="1.0" encoding="utf-8"?>
 <p:sld xmlns:a="http://schemas.openxmlformats.org/drawingml/2006/main" xmlns:r="http://schemas.openxmlformats.org/officeDocument/2006/relationships" xmlns:p="http://schemas.openxmlformats.org/presentationml/2006/main">
   <p:cSld>
     <p:spTree>
@@ -33949,7 +34407,7 @@
 </p:sld>
 </file>
 
-<file path=ppt/slides/slide35.xml><?xml version="1.0" encoding="utf-8"?>
+<file path=ppt/slides/slide36.xml><?xml version="1.0" encoding="utf-8"?>
 <p:sld xmlns:a="http://schemas.openxmlformats.org/drawingml/2006/main" xmlns:r="http://schemas.openxmlformats.org/officeDocument/2006/relationships" xmlns:p="http://schemas.openxmlformats.org/presentationml/2006/main">
   <p:cSld>
     <p:spTree>
@@ -34050,7 +34508,7 @@
 </p:sld>
 </file>
 
-<file path=ppt/slides/slide36.xml><?xml version="1.0" encoding="utf-8"?>
+<file path=ppt/slides/slide37.xml><?xml version="1.0" encoding="utf-8"?>
 <p:sld xmlns:a="http://schemas.openxmlformats.org/drawingml/2006/main" xmlns:r="http://schemas.openxmlformats.org/officeDocument/2006/relationships" xmlns:p="http://schemas.openxmlformats.org/presentationml/2006/main">
   <p:cSld>
     <p:spTree>

</xml_diff>